<commit_message>
Add presentation and diary
</commit_message>
<xml_diff>
--- a/documentation/presentation.pptx
+++ b/documentation/presentation.pptx
@@ -9,11 +9,18 @@
     <p:sldId id="257" r:id="rId3"/>
     <p:sldId id="258" r:id="rId4"/>
     <p:sldId id="259" r:id="rId5"/>
-    <p:sldId id="260" r:id="rId6"/>
-    <p:sldId id="261" r:id="rId7"/>
-    <p:sldId id="262" r:id="rId8"/>
-    <p:sldId id="264" r:id="rId9"/>
-    <p:sldId id="263" r:id="rId10"/>
+    <p:sldId id="270" r:id="rId6"/>
+    <p:sldId id="260" r:id="rId7"/>
+    <p:sldId id="265" r:id="rId8"/>
+    <p:sldId id="266" r:id="rId9"/>
+    <p:sldId id="267" r:id="rId10"/>
+    <p:sldId id="261" r:id="rId11"/>
+    <p:sldId id="269" r:id="rId12"/>
+    <p:sldId id="271" r:id="rId13"/>
+    <p:sldId id="268" r:id="rId14"/>
+    <p:sldId id="262" r:id="rId15"/>
+    <p:sldId id="264" r:id="rId16"/>
+    <p:sldId id="263" r:id="rId17"/>
   </p:sldIdLst>
   <p:sldSz cx="9144000" cy="6858000" type="screen4x3"/>
   <p:notesSz cx="6858000" cy="9144000"/>
@@ -3668,6 +3675,13 @@
               <a:rPr lang="de-DE" smtClean="0"/>
               <a:t>Android App „Pam“</a:t>
             </a:r>
+            <a:br>
+              <a:rPr lang="de-DE" smtClean="0"/>
+            </a:br>
+            <a:r>
+              <a:rPr lang="de-DE" smtClean="0"/>
+              <a:t>Hasan, Max, Marcel, Thomas</a:t>
+            </a:r>
             <a:endParaRPr lang="de-DE"/>
           </a:p>
         </p:txBody>
@@ -3691,6 +3705,704 @@
               <a:rPr lang="de-DE" smtClean="0"/>
               <a:t>Mitglieder der Gruppe</a:t>
             </a:r>
+            <a:endParaRPr lang="de-DE"/>
+          </a:p>
+        </p:txBody>
+      </p:sp>
+    </p:spTree>
+  </p:cSld>
+  <p:clrMapOvr>
+    <a:masterClrMapping/>
+  </p:clrMapOvr>
+</p:sld>
+</file>
+
+<file path=ppt/slides/slide10.xml><?xml version="1.0" encoding="utf-8"?>
+<p:sld xmlns:a="http://schemas.openxmlformats.org/drawingml/2006/main" xmlns:r="http://schemas.openxmlformats.org/officeDocument/2006/relationships" xmlns:p="http://schemas.openxmlformats.org/presentationml/2006/main">
+  <p:cSld>
+    <p:spTree>
+      <p:nvGrpSpPr>
+        <p:cNvPr id="1" name=""/>
+        <p:cNvGrpSpPr/>
+        <p:nvPr/>
+      </p:nvGrpSpPr>
+      <p:grpSpPr>
+        <a:xfrm>
+          <a:off x="0" y="0"/>
+          <a:ext cx="0" cy="0"/>
+          <a:chOff x="0" y="0"/>
+          <a:chExt cx="0" cy="0"/>
+        </a:xfrm>
+      </p:grpSpPr>
+      <p:sp>
+        <p:nvSpPr>
+          <p:cNvPr id="2" name="Titel 1"/>
+          <p:cNvSpPr>
+            <a:spLocks noGrp="1"/>
+          </p:cNvSpPr>
+          <p:nvPr>
+            <p:ph type="title"/>
+          </p:nvPr>
+        </p:nvSpPr>
+        <p:spPr/>
+        <p:txBody>
+          <a:bodyPr/>
+          <a:lstStyle/>
+          <a:p>
+            <a:r>
+              <a:rPr lang="de-DE" smtClean="0"/>
+              <a:t>Arbeitsbereich Max</a:t>
+            </a:r>
+            <a:endParaRPr lang="de-DE" dirty="0"/>
+          </a:p>
+        </p:txBody>
+      </p:sp>
+      <p:sp>
+        <p:nvSpPr>
+          <p:cNvPr id="3" name="Inhaltsplatzhalter 2"/>
+          <p:cNvSpPr>
+            <a:spLocks noGrp="1"/>
+          </p:cNvSpPr>
+          <p:nvPr>
+            <p:ph idx="1"/>
+          </p:nvPr>
+        </p:nvSpPr>
+        <p:spPr/>
+        <p:txBody>
+          <a:bodyPr/>
+          <a:lstStyle/>
+          <a:p>
+            <a:r>
+              <a:rPr lang="de-DE" smtClean="0"/>
+              <a:t>/values</a:t>
+            </a:r>
+          </a:p>
+          <a:p>
+            <a:pPr lvl="1"/>
+            <a:r>
+              <a:rPr lang="de-DE" smtClean="0"/>
+              <a:t>Dient der Übergabe der Variablen, von …</a:t>
+            </a:r>
+          </a:p>
+          <a:p>
+            <a:pPr lvl="1"/>
+            <a:endParaRPr lang="de-DE" smtClean="0"/>
+          </a:p>
+          <a:p>
+            <a:pPr lvl="1"/>
+            <a:endParaRPr lang="de-DE" smtClean="0"/>
+          </a:p>
+          <a:p>
+            <a:pPr lvl="1"/>
+            <a:endParaRPr lang="de-DE" smtClean="0"/>
+          </a:p>
+          <a:p>
+            <a:pPr lvl="1"/>
+            <a:endParaRPr lang="de-DE" smtClean="0"/>
+          </a:p>
+          <a:p>
+            <a:pPr lvl="1"/>
+            <a:r>
+              <a:rPr lang="de-DE" smtClean="0"/>
+              <a:t>Nach:</a:t>
+            </a:r>
+            <a:endParaRPr lang="de-DE"/>
+          </a:p>
+        </p:txBody>
+      </p:sp>
+      <p:pic>
+        <p:nvPicPr>
+          <p:cNvPr id="4" name="Grafik 3" descr="Strings.png"/>
+          <p:cNvPicPr>
+            <a:picLocks noChangeAspect="1"/>
+          </p:cNvPicPr>
+          <p:nvPr/>
+        </p:nvPicPr>
+        <p:blipFill>
+          <a:blip r:embed="rId2" cstate="print"/>
+          <a:stretch>
+            <a:fillRect/>
+          </a:stretch>
+        </p:blipFill>
+        <p:spPr>
+          <a:xfrm>
+            <a:off x="1187624" y="2708920"/>
+            <a:ext cx="2116266" cy="1800200"/>
+          </a:xfrm>
+          <a:prstGeom prst="rect">
+            <a:avLst/>
+          </a:prstGeom>
+        </p:spPr>
+      </p:pic>
+      <p:pic>
+        <p:nvPicPr>
+          <p:cNvPr id="6" name="Grafik 5" descr="Strings_2.png"/>
+          <p:cNvPicPr>
+            <a:picLocks noChangeAspect="1"/>
+          </p:cNvPicPr>
+          <p:nvPr/>
+        </p:nvPicPr>
+        <p:blipFill>
+          <a:blip r:embed="rId3" cstate="print"/>
+          <a:stretch>
+            <a:fillRect/>
+          </a:stretch>
+        </p:blipFill>
+        <p:spPr>
+          <a:xfrm>
+            <a:off x="3635896" y="2708920"/>
+            <a:ext cx="3743325" cy="1819275"/>
+          </a:xfrm>
+          <a:prstGeom prst="rect">
+            <a:avLst/>
+          </a:prstGeom>
+        </p:spPr>
+      </p:pic>
+      <p:pic>
+        <p:nvPicPr>
+          <p:cNvPr id="7" name="Grafik 6" descr="Strings_3.png"/>
+          <p:cNvPicPr>
+            <a:picLocks noChangeAspect="1"/>
+          </p:cNvPicPr>
+          <p:nvPr/>
+        </p:nvPicPr>
+        <p:blipFill>
+          <a:blip r:embed="rId4" cstate="print"/>
+          <a:stretch>
+            <a:fillRect/>
+          </a:stretch>
+        </p:blipFill>
+        <p:spPr>
+          <a:xfrm>
+            <a:off x="1187624" y="5013176"/>
+            <a:ext cx="4010025" cy="1428750"/>
+          </a:xfrm>
+          <a:prstGeom prst="rect">
+            <a:avLst/>
+          </a:prstGeom>
+        </p:spPr>
+      </p:pic>
+    </p:spTree>
+  </p:cSld>
+  <p:clrMapOvr>
+    <a:masterClrMapping/>
+  </p:clrMapOvr>
+</p:sld>
+</file>
+
+<file path=ppt/slides/slide11.xml><?xml version="1.0" encoding="utf-8"?>
+<p:sld xmlns:a="http://schemas.openxmlformats.org/drawingml/2006/main" xmlns:r="http://schemas.openxmlformats.org/officeDocument/2006/relationships" xmlns:p="http://schemas.openxmlformats.org/presentationml/2006/main">
+  <p:cSld>
+    <p:spTree>
+      <p:nvGrpSpPr>
+        <p:cNvPr id="1" name=""/>
+        <p:cNvGrpSpPr/>
+        <p:nvPr/>
+      </p:nvGrpSpPr>
+      <p:grpSpPr>
+        <a:xfrm>
+          <a:off x="0" y="0"/>
+          <a:ext cx="0" cy="0"/>
+          <a:chOff x="0" y="0"/>
+          <a:chExt cx="0" cy="0"/>
+        </a:xfrm>
+      </p:grpSpPr>
+      <p:sp>
+        <p:nvSpPr>
+          <p:cNvPr id="2" name="Titel 1"/>
+          <p:cNvSpPr>
+            <a:spLocks noGrp="1"/>
+          </p:cNvSpPr>
+          <p:nvPr>
+            <p:ph type="title"/>
+          </p:nvPr>
+        </p:nvSpPr>
+        <p:spPr/>
+        <p:txBody>
+          <a:bodyPr/>
+          <a:lstStyle/>
+          <a:p>
+            <a:r>
+              <a:rPr lang="de-DE" smtClean="0"/>
+              <a:t>Arbeitsbereich Max</a:t>
+            </a:r>
+            <a:endParaRPr lang="de-DE"/>
+          </a:p>
+        </p:txBody>
+      </p:sp>
+      <p:sp>
+        <p:nvSpPr>
+          <p:cNvPr id="3" name="Inhaltsplatzhalter 2"/>
+          <p:cNvSpPr>
+            <a:spLocks noGrp="1"/>
+          </p:cNvSpPr>
+          <p:nvPr>
+            <p:ph idx="1"/>
+          </p:nvPr>
+        </p:nvSpPr>
+        <p:spPr/>
+        <p:txBody>
+          <a:bodyPr/>
+          <a:lstStyle/>
+          <a:p>
+            <a:r>
+              <a:rPr lang="de-DE" smtClean="0"/>
+              <a:t>Probleme</a:t>
+            </a:r>
+          </a:p>
+          <a:p>
+            <a:pPr lvl="1"/>
+            <a:r>
+              <a:rPr lang="de-DE" smtClean="0"/>
+              <a:t>App ist nicht ausfürbar: Analyse mit Logcat</a:t>
+            </a:r>
+          </a:p>
+          <a:p>
+            <a:pPr lvl="1"/>
+            <a:r>
+              <a:rPr lang="de-DE" smtClean="0"/>
+              <a:t>Problem konnte nicht gelöst werden</a:t>
+            </a:r>
+            <a:endParaRPr lang="de-DE"/>
+          </a:p>
+        </p:txBody>
+      </p:sp>
+      <p:pic>
+        <p:nvPicPr>
+          <p:cNvPr id="4" name="Grafik 3" descr="Logcat.png"/>
+          <p:cNvPicPr>
+            <a:picLocks noChangeAspect="1"/>
+          </p:cNvPicPr>
+          <p:nvPr/>
+        </p:nvPicPr>
+        <p:blipFill>
+          <a:blip r:embed="rId2" cstate="print"/>
+          <a:stretch>
+            <a:fillRect/>
+          </a:stretch>
+        </p:blipFill>
+        <p:spPr>
+          <a:xfrm>
+            <a:off x="4788024" y="3212976"/>
+            <a:ext cx="4211960" cy="3550539"/>
+          </a:xfrm>
+          <a:prstGeom prst="rect">
+            <a:avLst/>
+          </a:prstGeom>
+          <a:ln w="38100" cap="sq">
+            <a:solidFill>
+              <a:srgbClr val="000000"/>
+            </a:solidFill>
+            <a:prstDash val="solid"/>
+            <a:miter lim="800000"/>
+          </a:ln>
+          <a:effectLst>
+            <a:outerShdw blurRad="50800" dist="38100" dir="2700000" algn="tl" rotWithShape="0">
+              <a:srgbClr val="000000">
+                <a:alpha val="43000"/>
+              </a:srgbClr>
+            </a:outerShdw>
+          </a:effectLst>
+        </p:spPr>
+      </p:pic>
+      <p:pic>
+        <p:nvPicPr>
+          <p:cNvPr id="5" name="Grafik 4" descr="Edit.png"/>
+          <p:cNvPicPr>
+            <a:picLocks noChangeAspect="1"/>
+          </p:cNvPicPr>
+          <p:nvPr/>
+        </p:nvPicPr>
+        <p:blipFill>
+          <a:blip r:embed="rId3" cstate="print"/>
+          <a:stretch>
+            <a:fillRect/>
+          </a:stretch>
+        </p:blipFill>
+        <p:spPr>
+          <a:xfrm>
+            <a:off x="971600" y="3356992"/>
+            <a:ext cx="2016224" cy="3009061"/>
+          </a:xfrm>
+          <a:prstGeom prst="rect">
+            <a:avLst/>
+          </a:prstGeom>
+          <a:ln w="38100" cap="sq">
+            <a:solidFill>
+              <a:srgbClr val="000000"/>
+            </a:solidFill>
+            <a:prstDash val="solid"/>
+            <a:miter lim="800000"/>
+          </a:ln>
+          <a:effectLst>
+            <a:outerShdw blurRad="50800" dist="38100" dir="2700000" algn="tl" rotWithShape="0">
+              <a:srgbClr val="000000">
+                <a:alpha val="43000"/>
+              </a:srgbClr>
+            </a:outerShdw>
+          </a:effectLst>
+        </p:spPr>
+      </p:pic>
+    </p:spTree>
+  </p:cSld>
+  <p:clrMapOvr>
+    <a:masterClrMapping/>
+  </p:clrMapOvr>
+</p:sld>
+</file>
+
+<file path=ppt/slides/slide12.xml><?xml version="1.0" encoding="utf-8"?>
+<p:sld xmlns:a="http://schemas.openxmlformats.org/drawingml/2006/main" xmlns:r="http://schemas.openxmlformats.org/officeDocument/2006/relationships" xmlns:p="http://schemas.openxmlformats.org/presentationml/2006/main">
+  <p:cSld>
+    <p:spTree>
+      <p:nvGrpSpPr>
+        <p:cNvPr id="1" name=""/>
+        <p:cNvGrpSpPr/>
+        <p:nvPr/>
+      </p:nvGrpSpPr>
+      <p:grpSpPr>
+        <a:xfrm>
+          <a:off x="0" y="0"/>
+          <a:ext cx="0" cy="0"/>
+          <a:chOff x="0" y="0"/>
+          <a:chExt cx="0" cy="0"/>
+        </a:xfrm>
+      </p:grpSpPr>
+      <p:sp>
+        <p:nvSpPr>
+          <p:cNvPr id="2" name="Titel 1"/>
+          <p:cNvSpPr>
+            <a:spLocks noGrp="1"/>
+          </p:cNvSpPr>
+          <p:nvPr>
+            <p:ph type="title"/>
+          </p:nvPr>
+        </p:nvSpPr>
+        <p:spPr/>
+        <p:txBody>
+          <a:bodyPr/>
+          <a:lstStyle/>
+          <a:p>
+            <a:r>
+              <a:rPr lang="de-DE" smtClean="0"/>
+              <a:t>Arbeitsbereich Max</a:t>
+            </a:r>
+            <a:endParaRPr lang="de-DE"/>
+          </a:p>
+        </p:txBody>
+      </p:sp>
+      <p:pic>
+        <p:nvPicPr>
+          <p:cNvPr id="4" name="Inhaltsplatzhalter 3" descr="Problems_Tabs.png"/>
+          <p:cNvPicPr>
+            <a:picLocks noGrp="1" noChangeAspect="1"/>
+          </p:cNvPicPr>
+          <p:nvPr>
+            <p:ph idx="1"/>
+          </p:nvPr>
+        </p:nvPicPr>
+        <p:blipFill>
+          <a:blip r:embed="rId2" cstate="print"/>
+          <a:stretch>
+            <a:fillRect/>
+          </a:stretch>
+        </p:blipFill>
+        <p:spPr>
+          <a:xfrm>
+            <a:off x="120500" y="1268760"/>
+            <a:ext cx="8915996" cy="5400600"/>
+          </a:xfrm>
+          <a:prstGeom prst="rect">
+            <a:avLst/>
+          </a:prstGeom>
+          <a:ln w="38100" cap="sq">
+            <a:solidFill>
+              <a:srgbClr val="000000"/>
+            </a:solidFill>
+            <a:prstDash val="solid"/>
+            <a:miter lim="800000"/>
+          </a:ln>
+          <a:effectLst>
+            <a:outerShdw blurRad="50800" dist="38100" dir="2700000" algn="tl" rotWithShape="0">
+              <a:srgbClr val="000000">
+                <a:alpha val="43000"/>
+              </a:srgbClr>
+            </a:outerShdw>
+          </a:effectLst>
+        </p:spPr>
+      </p:pic>
+    </p:spTree>
+  </p:cSld>
+  <p:clrMapOvr>
+    <a:masterClrMapping/>
+  </p:clrMapOvr>
+</p:sld>
+</file>
+
+<file path=ppt/slides/slide13.xml><?xml version="1.0" encoding="utf-8"?>
+<p:sld xmlns:a="http://schemas.openxmlformats.org/drawingml/2006/main" xmlns:r="http://schemas.openxmlformats.org/officeDocument/2006/relationships" xmlns:p="http://schemas.openxmlformats.org/presentationml/2006/main">
+  <p:cSld>
+    <p:spTree>
+      <p:nvGrpSpPr>
+        <p:cNvPr id="1" name=""/>
+        <p:cNvGrpSpPr/>
+        <p:nvPr/>
+      </p:nvGrpSpPr>
+      <p:grpSpPr>
+        <a:xfrm>
+          <a:off x="0" y="0"/>
+          <a:ext cx="0" cy="0"/>
+          <a:chOff x="0" y="0"/>
+          <a:chExt cx="0" cy="0"/>
+        </a:xfrm>
+      </p:grpSpPr>
+      <p:sp>
+        <p:nvSpPr>
+          <p:cNvPr id="2" name="Titel 1"/>
+          <p:cNvSpPr>
+            <a:spLocks noGrp="1"/>
+          </p:cNvSpPr>
+          <p:nvPr>
+            <p:ph type="title"/>
+          </p:nvPr>
+        </p:nvSpPr>
+        <p:spPr/>
+        <p:txBody>
+          <a:bodyPr/>
+          <a:lstStyle/>
+          <a:p>
+            <a:r>
+              <a:rPr lang="de-DE" smtClean="0"/>
+              <a:t>Arbeitsbereich Thomas</a:t>
+            </a:r>
+            <a:endParaRPr lang="de-DE"/>
+          </a:p>
+        </p:txBody>
+      </p:sp>
+      <p:sp>
+        <p:nvSpPr>
+          <p:cNvPr id="3" name="Inhaltsplatzhalter 2"/>
+          <p:cNvSpPr>
+            <a:spLocks noGrp="1"/>
+          </p:cNvSpPr>
+          <p:nvPr>
+            <p:ph idx="1"/>
+          </p:nvPr>
+        </p:nvSpPr>
+        <p:spPr/>
+        <p:txBody>
+          <a:bodyPr/>
+          <a:lstStyle/>
+          <a:p>
+            <a:endParaRPr lang="de-DE"/>
+          </a:p>
+        </p:txBody>
+      </p:sp>
+    </p:spTree>
+  </p:cSld>
+  <p:clrMapOvr>
+    <a:masterClrMapping/>
+  </p:clrMapOvr>
+</p:sld>
+</file>
+
+<file path=ppt/slides/slide14.xml><?xml version="1.0" encoding="utf-8"?>
+<p:sld xmlns:a="http://schemas.openxmlformats.org/drawingml/2006/main" xmlns:r="http://schemas.openxmlformats.org/officeDocument/2006/relationships" xmlns:p="http://schemas.openxmlformats.org/presentationml/2006/main">
+  <p:cSld>
+    <p:spTree>
+      <p:nvGrpSpPr>
+        <p:cNvPr id="1" name=""/>
+        <p:cNvGrpSpPr/>
+        <p:nvPr/>
+      </p:nvGrpSpPr>
+      <p:grpSpPr>
+        <a:xfrm>
+          <a:off x="0" y="0"/>
+          <a:ext cx="0" cy="0"/>
+          <a:chOff x="0" y="0"/>
+          <a:chExt cx="0" cy="0"/>
+        </a:xfrm>
+      </p:grpSpPr>
+      <p:sp>
+        <p:nvSpPr>
+          <p:cNvPr id="2" name="Titel 1"/>
+          <p:cNvSpPr>
+            <a:spLocks noGrp="1"/>
+          </p:cNvSpPr>
+          <p:nvPr>
+            <p:ph type="title"/>
+          </p:nvPr>
+        </p:nvSpPr>
+        <p:spPr/>
+        <p:txBody>
+          <a:bodyPr/>
+          <a:lstStyle/>
+          <a:p>
+            <a:r>
+              <a:rPr lang="de-DE" dirty="0"/>
+              <a:t>Arbeitsbereich - </a:t>
+            </a:r>
+            <a:r>
+              <a:rPr lang="de-DE" dirty="0" smtClean="0"/>
+              <a:t>Marcel</a:t>
+            </a:r>
+            <a:endParaRPr lang="de-DE" dirty="0"/>
+          </a:p>
+        </p:txBody>
+      </p:sp>
+      <p:sp>
+        <p:nvSpPr>
+          <p:cNvPr id="3" name="Inhaltsplatzhalter 2"/>
+          <p:cNvSpPr>
+            <a:spLocks noGrp="1"/>
+          </p:cNvSpPr>
+          <p:nvPr>
+            <p:ph idx="1"/>
+          </p:nvPr>
+        </p:nvSpPr>
+        <p:spPr/>
+        <p:txBody>
+          <a:bodyPr/>
+          <a:lstStyle/>
+          <a:p>
+            <a:endParaRPr lang="de-DE"/>
+          </a:p>
+        </p:txBody>
+      </p:sp>
+    </p:spTree>
+  </p:cSld>
+  <p:clrMapOvr>
+    <a:masterClrMapping/>
+  </p:clrMapOvr>
+</p:sld>
+</file>
+
+<file path=ppt/slides/slide15.xml><?xml version="1.0" encoding="utf-8"?>
+<p:sld xmlns:a="http://schemas.openxmlformats.org/drawingml/2006/main" xmlns:r="http://schemas.openxmlformats.org/officeDocument/2006/relationships" xmlns:p="http://schemas.openxmlformats.org/presentationml/2006/main">
+  <p:cSld>
+    <p:spTree>
+      <p:nvGrpSpPr>
+        <p:cNvPr id="1" name=""/>
+        <p:cNvGrpSpPr/>
+        <p:nvPr/>
+      </p:nvGrpSpPr>
+      <p:grpSpPr>
+        <a:xfrm>
+          <a:off x="0" y="0"/>
+          <a:ext cx="0" cy="0"/>
+          <a:chOff x="0" y="0"/>
+          <a:chExt cx="0" cy="0"/>
+        </a:xfrm>
+      </p:grpSpPr>
+      <p:sp>
+        <p:nvSpPr>
+          <p:cNvPr id="2" name="Titel 1"/>
+          <p:cNvSpPr>
+            <a:spLocks noGrp="1"/>
+          </p:cNvSpPr>
+          <p:nvPr>
+            <p:ph type="title"/>
+          </p:nvPr>
+        </p:nvSpPr>
+        <p:spPr/>
+        <p:txBody>
+          <a:bodyPr/>
+          <a:lstStyle/>
+          <a:p>
+            <a:r>
+              <a:rPr lang="de-DE" dirty="0"/>
+              <a:t>Arbeitsbereich - </a:t>
+            </a:r>
+            <a:r>
+              <a:rPr lang="de-DE" dirty="0" smtClean="0"/>
+              <a:t>Hasan</a:t>
+            </a:r>
+            <a:endParaRPr lang="de-DE" dirty="0"/>
+          </a:p>
+        </p:txBody>
+      </p:sp>
+      <p:sp>
+        <p:nvSpPr>
+          <p:cNvPr id="3" name="Inhaltsplatzhalter 2"/>
+          <p:cNvSpPr>
+            <a:spLocks noGrp="1"/>
+          </p:cNvSpPr>
+          <p:nvPr>
+            <p:ph idx="1"/>
+          </p:nvPr>
+        </p:nvSpPr>
+        <p:spPr/>
+        <p:txBody>
+          <a:bodyPr/>
+          <a:lstStyle/>
+          <a:p>
+            <a:endParaRPr lang="de-DE"/>
+          </a:p>
+        </p:txBody>
+      </p:sp>
+    </p:spTree>
+  </p:cSld>
+  <p:clrMapOvr>
+    <a:masterClrMapping/>
+  </p:clrMapOvr>
+</p:sld>
+</file>
+
+<file path=ppt/slides/slide16.xml><?xml version="1.0" encoding="utf-8"?>
+<p:sld xmlns:a="http://schemas.openxmlformats.org/drawingml/2006/main" xmlns:r="http://schemas.openxmlformats.org/officeDocument/2006/relationships" xmlns:p="http://schemas.openxmlformats.org/presentationml/2006/main">
+  <p:cSld>
+    <p:spTree>
+      <p:nvGrpSpPr>
+        <p:cNvPr id="1" name=""/>
+        <p:cNvGrpSpPr/>
+        <p:nvPr/>
+      </p:nvGrpSpPr>
+      <p:grpSpPr>
+        <a:xfrm>
+          <a:off x="0" y="0"/>
+          <a:ext cx="0" cy="0"/>
+          <a:chOff x="0" y="0"/>
+          <a:chExt cx="0" cy="0"/>
+        </a:xfrm>
+      </p:grpSpPr>
+      <p:sp>
+        <p:nvSpPr>
+          <p:cNvPr id="2" name="Titel 1"/>
+          <p:cNvSpPr>
+            <a:spLocks noGrp="1"/>
+          </p:cNvSpPr>
+          <p:nvPr>
+            <p:ph type="title"/>
+          </p:nvPr>
+        </p:nvSpPr>
+        <p:spPr/>
+        <p:txBody>
+          <a:bodyPr/>
+          <a:lstStyle/>
+          <a:p>
+            <a:r>
+              <a:rPr lang="de-DE" dirty="0" smtClean="0"/>
+              <a:t>Resultate</a:t>
+            </a:r>
+            <a:endParaRPr lang="de-DE" dirty="0"/>
+          </a:p>
+        </p:txBody>
+      </p:sp>
+      <p:sp>
+        <p:nvSpPr>
+          <p:cNvPr id="3" name="Inhaltsplatzhalter 2"/>
+          <p:cNvSpPr>
+            <a:spLocks noGrp="1"/>
+          </p:cNvSpPr>
+          <p:nvPr>
+            <p:ph idx="1"/>
+          </p:nvPr>
+        </p:nvSpPr>
+        <p:spPr/>
+        <p:txBody>
+          <a:bodyPr/>
+          <a:lstStyle/>
+          <a:p>
             <a:endParaRPr lang="de-DE"/>
           </a:p>
         </p:txBody>
@@ -3948,7 +4660,6 @@
               <a:rPr lang="de-DE" dirty="0" smtClean="0"/>
               <a:t>Passwort geschützt</a:t>
             </a:r>
-            <a:endParaRPr lang="de-DE" dirty="0" smtClean="0"/>
           </a:p>
         </p:txBody>
       </p:sp>
@@ -4081,10 +4792,10 @@
           <p:nvPr/>
         </p:nvPicPr>
         <p:blipFill>
-          <a:blip r:embed="rId2">
+          <a:blip r:embed="rId2" cstate="print">
             <a:extLst>
               <a:ext uri="{28A0092B-C50C-407E-A947-70E740481C1C}">
-                <a14:useLocalDpi xmlns:a14="http://schemas.microsoft.com/office/drawing/2010/main" val="0"/>
+                <a14:useLocalDpi xmlns:a14="http://schemas.microsoft.com/office/drawing/2010/main" xmlns="" val="0"/>
               </a:ext>
             </a:extLst>
           </a:blip>
@@ -4104,7 +4815,7 @@
           <a:noFill/>
           <a:extLst>
             <a:ext uri="{909E8E84-426E-40DD-AFC4-6F175D3DCCD1}">
-              <a14:hiddenFill xmlns:a14="http://schemas.microsoft.com/office/drawing/2010/main">
+              <a14:hiddenFill xmlns:a14="http://schemas.microsoft.com/office/drawing/2010/main" xmlns="">
                 <a:solidFill>
                   <a:srgbClr val="FFFFFF"/>
                 </a:solidFill>
@@ -4122,10 +4833,10 @@
           <p:nvPr/>
         </p:nvPicPr>
         <p:blipFill>
-          <a:blip r:embed="rId3">
+          <a:blip r:embed="rId3" cstate="print">
             <a:extLst>
               <a:ext uri="{28A0092B-C50C-407E-A947-70E740481C1C}">
-                <a14:useLocalDpi xmlns:a14="http://schemas.microsoft.com/office/drawing/2010/main" val="0"/>
+                <a14:useLocalDpi xmlns:a14="http://schemas.microsoft.com/office/drawing/2010/main" xmlns="" val="0"/>
               </a:ext>
             </a:extLst>
           </a:blip>
@@ -4145,7 +4856,7 @@
           <a:noFill/>
           <a:extLst>
             <a:ext uri="{909E8E84-426E-40DD-AFC4-6F175D3DCCD1}">
-              <a14:hiddenFill xmlns:a14="http://schemas.microsoft.com/office/drawing/2010/main">
+              <a14:hiddenFill xmlns:a14="http://schemas.microsoft.com/office/drawing/2010/main" xmlns="">
                 <a:solidFill>
                   <a:srgbClr val="FFFFFF"/>
                 </a:solidFill>
@@ -4166,7 +4877,7 @@
           <a:blip r:embed="rId4" cstate="print">
             <a:extLst>
               <a:ext uri="{28A0092B-C50C-407E-A947-70E740481C1C}">
-                <a14:useLocalDpi xmlns:a14="http://schemas.microsoft.com/office/drawing/2010/main" val="0"/>
+                <a14:useLocalDpi xmlns:a14="http://schemas.microsoft.com/office/drawing/2010/main" xmlns="" val="0"/>
               </a:ext>
             </a:extLst>
           </a:blip>
@@ -4186,7 +4897,7 @@
           <a:noFill/>
           <a:extLst>
             <a:ext uri="{909E8E84-426E-40DD-AFC4-6F175D3DCCD1}">
-              <a14:hiddenFill xmlns:a14="http://schemas.microsoft.com/office/drawing/2010/main">
+              <a14:hiddenFill xmlns:a14="http://schemas.microsoft.com/office/drawing/2010/main" xmlns="">
                 <a:solidFill>
                   <a:srgbClr val="FFFFFF"/>
                 </a:solidFill>
@@ -4236,28 +4947,108 @@
           <a:lstStyle/>
           <a:p>
             <a:r>
-              <a:rPr lang="de-DE" dirty="0" smtClean="0"/>
-              <a:t>Arbeitsbereich - Max</a:t>
-            </a:r>
-            <a:endParaRPr lang="de-DE" dirty="0"/>
-          </a:p>
-        </p:txBody>
-      </p:sp>
-      <p:sp>
-        <p:nvSpPr>
-          <p:cNvPr id="3" name="Inhaltsplatzhalter 2"/>
-          <p:cNvSpPr>
-            <a:spLocks noGrp="1"/>
-          </p:cNvSpPr>
-          <p:nvPr>
-            <p:ph idx="1"/>
-          </p:nvPr>
-        </p:nvSpPr>
-        <p:spPr/>
-        <p:txBody>
-          <a:bodyPr/>
-          <a:lstStyle/>
-          <a:p>
+              <a:rPr lang="de-DE" smtClean="0"/>
+              <a:t>Arbeitsweise</a:t>
+            </a:r>
+            <a:endParaRPr lang="de-DE"/>
+          </a:p>
+        </p:txBody>
+      </p:sp>
+      <p:pic>
+        <p:nvPicPr>
+          <p:cNvPr id="4" name="Inhaltsplatzhalter 3" descr="Versions.png"/>
+          <p:cNvPicPr>
+            <a:picLocks noGrp="1" noChangeAspect="1"/>
+          </p:cNvPicPr>
+          <p:nvPr>
+            <p:ph sz="half" idx="1"/>
+          </p:nvPr>
+        </p:nvPicPr>
+        <p:blipFill>
+          <a:blip r:embed="rId2" cstate="print"/>
+          <a:stretch>
+            <a:fillRect/>
+          </a:stretch>
+        </p:blipFill>
+        <p:spPr>
+          <a:xfrm>
+            <a:off x="457200" y="2362016"/>
+            <a:ext cx="3657600" cy="3002330"/>
+          </a:xfrm>
+          <a:prstGeom prst="rect">
+            <a:avLst/>
+          </a:prstGeom>
+          <a:ln w="38100" cap="sq">
+            <a:solidFill>
+              <a:srgbClr val="000000"/>
+            </a:solidFill>
+            <a:prstDash val="solid"/>
+            <a:miter lim="800000"/>
+          </a:ln>
+          <a:effectLst>
+            <a:outerShdw blurRad="50800" dist="38100" dir="2700000" algn="tl" rotWithShape="0">
+              <a:srgbClr val="000000">
+                <a:alpha val="43000"/>
+              </a:srgbClr>
+            </a:outerShdw>
+          </a:effectLst>
+        </p:spPr>
+      </p:pic>
+      <p:sp>
+        <p:nvSpPr>
+          <p:cNvPr id="5" name="Inhaltsplatzhalter 4"/>
+          <p:cNvSpPr>
+            <a:spLocks noGrp="1"/>
+          </p:cNvSpPr>
+          <p:nvPr>
+            <p:ph sz="half" idx="2"/>
+          </p:nvPr>
+        </p:nvSpPr>
+        <p:spPr/>
+        <p:txBody>
+          <a:bodyPr/>
+          <a:lstStyle/>
+          <a:p>
+            <a:r>
+              <a:rPr lang="de-DE" smtClean="0"/>
+              <a:t>Gleichzeitiges Arbeiten an einem Projekt</a:t>
+            </a:r>
+          </a:p>
+          <a:p>
+            <a:r>
+              <a:rPr lang="de-DE" smtClean="0"/>
+              <a:t>Jeder kann unabhängig von den anderen arbeiten</a:t>
+            </a:r>
+            <a:endParaRPr lang="de-DE"/>
+          </a:p>
+        </p:txBody>
+      </p:sp>
+      <p:sp>
+        <p:nvSpPr>
+          <p:cNvPr id="6" name="Textfeld 5"/>
+          <p:cNvSpPr txBox="1"/>
+          <p:nvPr/>
+        </p:nvSpPr>
+        <p:spPr>
+          <a:xfrm>
+            <a:off x="395536" y="1916832"/>
+            <a:ext cx="3744416" cy="369332"/>
+          </a:xfrm>
+          <a:prstGeom prst="rect">
+            <a:avLst/>
+          </a:prstGeom>
+          <a:noFill/>
+        </p:spPr>
+        <p:txBody>
+          <a:bodyPr wrap="square" rtlCol="0">
+            <a:spAutoFit/>
+          </a:bodyPr>
+          <a:lstStyle/>
+          <a:p>
+            <a:r>
+              <a:rPr lang="de-DE" smtClean="0"/>
+              <a:t>Github</a:t>
+            </a:r>
             <a:endParaRPr lang="de-DE"/>
           </a:p>
         </p:txBody>
@@ -4303,12 +5094,8 @@
           <a:lstStyle/>
           <a:p>
             <a:r>
-              <a:rPr lang="de-DE" dirty="0"/>
-              <a:t>Arbeitsbereich - </a:t>
-            </a:r>
-            <a:r>
               <a:rPr lang="de-DE" dirty="0" smtClean="0"/>
-              <a:t>Thomas</a:t>
+              <a:t>Arbeitsbereich - Max</a:t>
             </a:r>
             <a:endParaRPr lang="de-DE" dirty="0"/>
           </a:p>
@@ -4326,13 +5113,116 @@
         </p:nvSpPr>
         <p:spPr/>
         <p:txBody>
-          <a:bodyPr/>
-          <a:lstStyle/>
-          <a:p>
-            <a:endParaRPr lang="de-DE"/>
-          </a:p>
-        </p:txBody>
-      </p:sp>
+          <a:bodyPr>
+            <a:normAutofit/>
+          </a:bodyPr>
+          <a:lstStyle/>
+          <a:p>
+            <a:r>
+              <a:rPr lang="de-DE" sz="2400" smtClean="0"/>
+              <a:t>Aneignung von Wissen:</a:t>
+            </a:r>
+          </a:p>
+          <a:p>
+            <a:pPr lvl="1"/>
+            <a:r>
+              <a:rPr lang="de-DE" sz="2000" smtClean="0"/>
+              <a:t>Java</a:t>
+            </a:r>
+          </a:p>
+          <a:p>
+            <a:pPr lvl="1"/>
+            <a:r>
+              <a:rPr lang="de-DE" sz="2000" smtClean="0"/>
+              <a:t>GitHub</a:t>
+            </a:r>
+          </a:p>
+          <a:p>
+            <a:pPr lvl="1"/>
+            <a:r>
+              <a:rPr lang="de-DE" sz="2000" smtClean="0"/>
+              <a:t>Android Programmierung</a:t>
+            </a:r>
+          </a:p>
+          <a:p>
+            <a:r>
+              <a:rPr lang="de-DE" sz="2400" smtClean="0"/>
+              <a:t>Erstellung der Oberfläche</a:t>
+            </a:r>
+          </a:p>
+          <a:p>
+            <a:r>
+              <a:rPr lang="de-DE" sz="2400" smtClean="0"/>
+              <a:t>/res: beinhaltet die Layout Files</a:t>
+            </a:r>
+          </a:p>
+          <a:p>
+            <a:r>
+              <a:rPr lang="de-DE" sz="2400" smtClean="0"/>
+              <a:t>/src: beinhaltet den Java Code</a:t>
+            </a:r>
+          </a:p>
+          <a:p>
+            <a:r>
+              <a:rPr lang="de-DE" sz="2400" smtClean="0"/>
+              <a:t>/values: z.B. Strings und Arrays</a:t>
+            </a:r>
+          </a:p>
+          <a:p>
+            <a:r>
+              <a:rPr lang="de-DE" sz="2400" smtClean="0"/>
+              <a:t>Android Manifest</a:t>
+            </a:r>
+          </a:p>
+          <a:p>
+            <a:endParaRPr lang="de-DE" sz="2400" smtClean="0"/>
+          </a:p>
+          <a:p>
+            <a:pPr lvl="1">
+              <a:buNone/>
+            </a:pPr>
+            <a:endParaRPr lang="de-DE" sz="2000" smtClean="0"/>
+          </a:p>
+        </p:txBody>
+      </p:sp>
+      <p:pic>
+        <p:nvPicPr>
+          <p:cNvPr id="4" name="Grafik 3" descr="Tree.png"/>
+          <p:cNvPicPr>
+            <a:picLocks noChangeAspect="1"/>
+          </p:cNvPicPr>
+          <p:nvPr/>
+        </p:nvPicPr>
+        <p:blipFill>
+          <a:blip r:embed="rId2" cstate="print"/>
+          <a:stretch>
+            <a:fillRect/>
+          </a:stretch>
+        </p:blipFill>
+        <p:spPr>
+          <a:xfrm>
+            <a:off x="6660232" y="260648"/>
+            <a:ext cx="2129905" cy="6381328"/>
+          </a:xfrm>
+          <a:prstGeom prst="rect">
+            <a:avLst/>
+          </a:prstGeom>
+          <a:ln w="38100" cap="sq">
+            <a:solidFill>
+              <a:srgbClr val="000000"/>
+            </a:solidFill>
+            <a:prstDash val="solid"/>
+            <a:miter lim="800000"/>
+          </a:ln>
+          <a:effectLst>
+            <a:outerShdw blurRad="50800" dist="38100" dir="2700000" algn="tl" rotWithShape="0">
+              <a:srgbClr val="000000">
+                <a:alpha val="43000"/>
+              </a:srgbClr>
+            </a:outerShdw>
+          </a:effectLst>
+        </p:spPr>
+      </p:pic>
     </p:spTree>
   </p:cSld>
   <p:clrMapOvr>
@@ -4374,14 +5264,10 @@
           <a:lstStyle/>
           <a:p>
             <a:r>
-              <a:rPr lang="de-DE" dirty="0"/>
-              <a:t>Arbeitsbereich - </a:t>
-            </a:r>
-            <a:r>
-              <a:rPr lang="de-DE" dirty="0" smtClean="0"/>
-              <a:t>Marcel</a:t>
-            </a:r>
-            <a:endParaRPr lang="de-DE" dirty="0"/>
+              <a:rPr lang="de-DE" smtClean="0"/>
+              <a:t>Arbeitsbereich Max</a:t>
+            </a:r>
+            <a:endParaRPr lang="de-DE"/>
           </a:p>
         </p:txBody>
       </p:sp>
@@ -4397,13 +5283,109 @@
         </p:nvSpPr>
         <p:spPr/>
         <p:txBody>
-          <a:bodyPr/>
-          <a:lstStyle/>
-          <a:p>
-            <a:endParaRPr lang="de-DE"/>
-          </a:p>
-        </p:txBody>
-      </p:sp>
+          <a:bodyPr>
+            <a:normAutofit/>
+          </a:bodyPr>
+          <a:lstStyle/>
+          <a:p>
+            <a:r>
+              <a:rPr lang="de-DE" sz="2400" smtClean="0"/>
+              <a:t>/res:</a:t>
+            </a:r>
+          </a:p>
+          <a:p>
+            <a:pPr lvl="1"/>
+            <a:r>
+              <a:rPr lang="de-DE" sz="2000" smtClean="0"/>
+              <a:t>Oberfläche wird per XML gespeichert</a:t>
+            </a:r>
+          </a:p>
+          <a:p>
+            <a:pPr lvl="1"/>
+            <a:r>
+              <a:rPr lang="de-DE" sz="2000" smtClean="0"/>
+              <a:t>Editierbar in Quelltext und im grafischen Layout</a:t>
+            </a:r>
+            <a:endParaRPr lang="de-DE" sz="2000"/>
+          </a:p>
+        </p:txBody>
+      </p:sp>
+      <p:pic>
+        <p:nvPicPr>
+          <p:cNvPr id="4" name="Grafik 3" descr="Login.png"/>
+          <p:cNvPicPr>
+            <a:picLocks noChangeAspect="1"/>
+          </p:cNvPicPr>
+          <p:nvPr/>
+        </p:nvPicPr>
+        <p:blipFill>
+          <a:blip r:embed="rId2" cstate="print"/>
+          <a:stretch>
+            <a:fillRect/>
+          </a:stretch>
+        </p:blipFill>
+        <p:spPr>
+          <a:xfrm>
+            <a:off x="6479704" y="2908372"/>
+            <a:ext cx="2664296" cy="3949628"/>
+          </a:xfrm>
+          <a:prstGeom prst="rect">
+            <a:avLst/>
+          </a:prstGeom>
+          <a:ln w="38100" cap="sq">
+            <a:solidFill>
+              <a:srgbClr val="000000"/>
+            </a:solidFill>
+            <a:prstDash val="solid"/>
+            <a:miter lim="800000"/>
+          </a:ln>
+          <a:effectLst>
+            <a:outerShdw blurRad="50800" dist="38100" dir="2700000" algn="tl" rotWithShape="0">
+              <a:srgbClr val="000000">
+                <a:alpha val="43000"/>
+              </a:srgbClr>
+            </a:outerShdw>
+          </a:effectLst>
+        </p:spPr>
+      </p:pic>
+      <p:pic>
+        <p:nvPicPr>
+          <p:cNvPr id="5" name="Grafik 4" descr="Codeblock_1.png"/>
+          <p:cNvPicPr>
+            <a:picLocks noChangeAspect="1"/>
+          </p:cNvPicPr>
+          <p:nvPr/>
+        </p:nvPicPr>
+        <p:blipFill>
+          <a:blip r:embed="rId3" cstate="print"/>
+          <a:stretch>
+            <a:fillRect/>
+          </a:stretch>
+        </p:blipFill>
+        <p:spPr>
+          <a:xfrm>
+            <a:off x="0" y="2924945"/>
+            <a:ext cx="6384764" cy="3933056"/>
+          </a:xfrm>
+          <a:prstGeom prst="rect">
+            <a:avLst/>
+          </a:prstGeom>
+          <a:ln w="38100" cap="sq">
+            <a:solidFill>
+              <a:srgbClr val="000000"/>
+            </a:solidFill>
+            <a:prstDash val="solid"/>
+            <a:miter lim="800000"/>
+          </a:ln>
+          <a:effectLst>
+            <a:outerShdw blurRad="50800" dist="38100" dir="2700000" algn="tl" rotWithShape="0">
+              <a:srgbClr val="000000">
+                <a:alpha val="43000"/>
+              </a:srgbClr>
+            </a:outerShdw>
+          </a:effectLst>
+        </p:spPr>
+      </p:pic>
     </p:spTree>
   </p:cSld>
   <p:clrMapOvr>
@@ -4445,14 +5427,10 @@
           <a:lstStyle/>
           <a:p>
             <a:r>
-              <a:rPr lang="de-DE" dirty="0"/>
-              <a:t>Arbeitsbereich - </a:t>
-            </a:r>
-            <a:r>
-              <a:rPr lang="de-DE" dirty="0" smtClean="0"/>
-              <a:t>Hasan</a:t>
-            </a:r>
-            <a:endParaRPr lang="de-DE" dirty="0"/>
+              <a:rPr lang="de-DE" smtClean="0"/>
+              <a:t>Arbeitsbereich Max</a:t>
+            </a:r>
+            <a:endParaRPr lang="de-DE"/>
           </a:p>
         </p:txBody>
       </p:sp>
@@ -4471,10 +5449,59 @@
           <a:bodyPr/>
           <a:lstStyle/>
           <a:p>
+            <a:r>
+              <a:rPr lang="de-DE" smtClean="0"/>
+              <a:t>/src</a:t>
+            </a:r>
+          </a:p>
+          <a:p>
+            <a:pPr lvl="1"/>
+            <a:r>
+              <a:rPr lang="de-DE" smtClean="0"/>
+              <a:t>Beinhaltet den Quelltext in Java</a:t>
+            </a:r>
             <a:endParaRPr lang="de-DE"/>
           </a:p>
         </p:txBody>
       </p:sp>
+      <p:pic>
+        <p:nvPicPr>
+          <p:cNvPr id="4" name="Grafik 3" descr="CodeBlock_2.png"/>
+          <p:cNvPicPr>
+            <a:picLocks noChangeAspect="1"/>
+          </p:cNvPicPr>
+          <p:nvPr/>
+        </p:nvPicPr>
+        <p:blipFill>
+          <a:blip r:embed="rId2" cstate="print"/>
+          <a:stretch>
+            <a:fillRect/>
+          </a:stretch>
+        </p:blipFill>
+        <p:spPr>
+          <a:xfrm>
+            <a:off x="611560" y="2636912"/>
+            <a:ext cx="5334000" cy="3667125"/>
+          </a:xfrm>
+          <a:prstGeom prst="rect">
+            <a:avLst/>
+          </a:prstGeom>
+          <a:ln w="38100" cap="sq">
+            <a:solidFill>
+              <a:srgbClr val="000000"/>
+            </a:solidFill>
+            <a:prstDash val="solid"/>
+            <a:miter lim="800000"/>
+          </a:ln>
+          <a:effectLst>
+            <a:outerShdw blurRad="50800" dist="38100" dir="2700000" algn="tl" rotWithShape="0">
+              <a:srgbClr val="000000">
+                <a:alpha val="43000"/>
+              </a:srgbClr>
+            </a:outerShdw>
+          </a:effectLst>
+        </p:spPr>
+      </p:pic>
     </p:spTree>
   </p:cSld>
   <p:clrMapOvr>
@@ -4516,10 +5543,10 @@
           <a:lstStyle/>
           <a:p>
             <a:r>
-              <a:rPr lang="de-DE" dirty="0" smtClean="0"/>
-              <a:t>Resultate</a:t>
-            </a:r>
-            <a:endParaRPr lang="de-DE" dirty="0"/>
+              <a:rPr lang="de-DE" smtClean="0"/>
+              <a:t>Arbeitsbereich Max</a:t>
+            </a:r>
+            <a:endParaRPr lang="de-DE"/>
           </a:p>
         </p:txBody>
       </p:sp>
@@ -4538,10 +5565,106 @@
           <a:bodyPr/>
           <a:lstStyle/>
           <a:p>
+            <a:r>
+              <a:rPr lang="de-DE" smtClean="0"/>
+              <a:t>Android Manifest</a:t>
+            </a:r>
+          </a:p>
+          <a:p>
+            <a:pPr lvl="1"/>
+            <a:r>
+              <a:rPr lang="de-DE" smtClean="0"/>
+              <a:t>Behinhaltet, Rechtvergabe und</a:t>
+            </a:r>
+            <a:br>
+              <a:rPr lang="de-DE" smtClean="0"/>
+            </a:br>
+            <a:r>
+              <a:rPr lang="de-DE" smtClean="0"/>
+              <a:t>generelle Einstellungen</a:t>
+            </a:r>
+          </a:p>
+          <a:p>
             <a:endParaRPr lang="de-DE"/>
           </a:p>
         </p:txBody>
       </p:sp>
+      <p:pic>
+        <p:nvPicPr>
+          <p:cNvPr id="4" name="Grafik 3" descr="Manifest_1.png"/>
+          <p:cNvPicPr>
+            <a:picLocks noChangeAspect="1"/>
+          </p:cNvPicPr>
+          <p:nvPr/>
+        </p:nvPicPr>
+        <p:blipFill>
+          <a:blip r:embed="rId2" cstate="print"/>
+          <a:stretch>
+            <a:fillRect/>
+          </a:stretch>
+        </p:blipFill>
+        <p:spPr>
+          <a:xfrm>
+            <a:off x="251520" y="3212976"/>
+            <a:ext cx="5656695" cy="3351430"/>
+          </a:xfrm>
+          <a:prstGeom prst="rect">
+            <a:avLst/>
+          </a:prstGeom>
+          <a:ln w="38100" cap="sq">
+            <a:solidFill>
+              <a:srgbClr val="000000"/>
+            </a:solidFill>
+            <a:prstDash val="solid"/>
+            <a:miter lim="800000"/>
+          </a:ln>
+          <a:effectLst>
+            <a:outerShdw blurRad="50800" dist="38100" dir="2700000" algn="tl" rotWithShape="0">
+              <a:srgbClr val="000000">
+                <a:alpha val="43000"/>
+              </a:srgbClr>
+            </a:outerShdw>
+          </a:effectLst>
+        </p:spPr>
+      </p:pic>
+      <p:pic>
+        <p:nvPicPr>
+          <p:cNvPr id="5" name="Grafik 4" descr="Manifest_2.png"/>
+          <p:cNvPicPr>
+            <a:picLocks noChangeAspect="1"/>
+          </p:cNvPicPr>
+          <p:nvPr/>
+        </p:nvPicPr>
+        <p:blipFill>
+          <a:blip r:embed="rId3" cstate="print"/>
+          <a:stretch>
+            <a:fillRect/>
+          </a:stretch>
+        </p:blipFill>
+        <p:spPr>
+          <a:xfrm>
+            <a:off x="6012160" y="188640"/>
+            <a:ext cx="2880320" cy="2790621"/>
+          </a:xfrm>
+          <a:prstGeom prst="rect">
+            <a:avLst/>
+          </a:prstGeom>
+          <a:ln w="38100" cap="sq">
+            <a:solidFill>
+              <a:srgbClr val="000000"/>
+            </a:solidFill>
+            <a:prstDash val="solid"/>
+            <a:miter lim="800000"/>
+          </a:ln>
+          <a:effectLst>
+            <a:outerShdw blurRad="50800" dist="38100" dir="2700000" algn="tl" rotWithShape="0">
+              <a:srgbClr val="000000">
+                <a:alpha val="43000"/>
+              </a:srgbClr>
+            </a:outerShdw>
+          </a:effectLst>
+        </p:spPr>
+      </p:pic>
     </p:spTree>
   </p:cSld>
   <p:clrMapOvr>
@@ -4555,7 +5678,7 @@
   <a:themeElements>
     <a:clrScheme name="Haemera">
       <a:dk1>
-        <a:sysClr val="windowText" lastClr="000000"/>
+        <a:sysClr val="windowText" lastClr="111518"/>
       </a:dk1>
       <a:lt1>
         <a:sysClr val="window" lastClr="FFFFFF"/>

</xml_diff>

<commit_message>
Add my personal part of the presentation.
</commit_message>
<xml_diff>
--- a/documentation/presentation.pptx
+++ b/documentation/presentation.pptx
@@ -19,8 +19,10 @@
     <p:sldId id="271" r:id="rId13"/>
     <p:sldId id="268" r:id="rId14"/>
     <p:sldId id="262" r:id="rId15"/>
-    <p:sldId id="264" r:id="rId16"/>
-    <p:sldId id="263" r:id="rId17"/>
+    <p:sldId id="272" r:id="rId16"/>
+    <p:sldId id="273" r:id="rId17"/>
+    <p:sldId id="264" r:id="rId18"/>
+    <p:sldId id="263" r:id="rId19"/>
   </p:sldIdLst>
   <p:sldSz cx="9144000" cy="6858000" type="screen4x3"/>
   <p:notesSz cx="6858000" cy="9144000"/>
@@ -507,7 +509,7 @@
             <a:fld id="{1BA50D42-C9CD-4801-B293-61D1F53EC57E}" type="datetimeFigureOut">
               <a:rPr lang="de-DE" smtClean="0"/>
               <a:pPr/>
-              <a:t>18.01.2013</a:t>
+              <a:t>23.01.2013</a:t>
             </a:fld>
             <a:endParaRPr lang="de-DE"/>
           </a:p>
@@ -674,7 +676,7 @@
             <a:fld id="{1BA50D42-C9CD-4801-B293-61D1F53EC57E}" type="datetimeFigureOut">
               <a:rPr lang="de-DE" smtClean="0"/>
               <a:pPr/>
-              <a:t>18.01.2013</a:t>
+              <a:t>23.01.2013</a:t>
             </a:fld>
             <a:endParaRPr lang="de-DE"/>
           </a:p>
@@ -851,7 +853,7 @@
             <a:fld id="{1BA50D42-C9CD-4801-B293-61D1F53EC57E}" type="datetimeFigureOut">
               <a:rPr lang="de-DE" smtClean="0"/>
               <a:pPr/>
-              <a:t>18.01.2013</a:t>
+              <a:t>23.01.2013</a:t>
             </a:fld>
             <a:endParaRPr lang="de-DE"/>
           </a:p>
@@ -1022,7 +1024,7 @@
             <a:fld id="{1BA50D42-C9CD-4801-B293-61D1F53EC57E}" type="datetimeFigureOut">
               <a:rPr lang="de-DE" smtClean="0"/>
               <a:pPr/>
-              <a:t>18.01.2013</a:t>
+              <a:t>23.01.2013</a:t>
             </a:fld>
             <a:endParaRPr lang="de-DE"/>
           </a:p>
@@ -1479,7 +1481,7 @@
             <a:fld id="{1BA50D42-C9CD-4801-B293-61D1F53EC57E}" type="datetimeFigureOut">
               <a:rPr lang="de-DE" smtClean="0"/>
               <a:pPr/>
-              <a:t>18.01.2013</a:t>
+              <a:t>23.01.2013</a:t>
             </a:fld>
             <a:endParaRPr lang="de-DE"/>
           </a:p>
@@ -1745,7 +1747,7 @@
             <a:fld id="{1BA50D42-C9CD-4801-B293-61D1F53EC57E}" type="datetimeFigureOut">
               <a:rPr lang="de-DE" smtClean="0"/>
               <a:pPr/>
-              <a:t>18.01.2013</a:t>
+              <a:t>23.01.2013</a:t>
             </a:fld>
             <a:endParaRPr lang="de-DE"/>
           </a:p>
@@ -2121,7 +2123,7 @@
             <a:fld id="{1BA50D42-C9CD-4801-B293-61D1F53EC57E}" type="datetimeFigureOut">
               <a:rPr lang="de-DE" smtClean="0"/>
               <a:pPr/>
-              <a:t>18.01.2013</a:t>
+              <a:t>23.01.2013</a:t>
             </a:fld>
             <a:endParaRPr lang="de-DE"/>
           </a:p>
@@ -2245,7 +2247,7 @@
             <a:fld id="{1BA50D42-C9CD-4801-B293-61D1F53EC57E}" type="datetimeFigureOut">
               <a:rPr lang="de-DE" smtClean="0"/>
               <a:pPr/>
-              <a:t>18.01.2013</a:t>
+              <a:t>23.01.2013</a:t>
             </a:fld>
             <a:endParaRPr lang="de-DE"/>
           </a:p>
@@ -2337,7 +2339,7 @@
             <a:fld id="{1BA50D42-C9CD-4801-B293-61D1F53EC57E}" type="datetimeFigureOut">
               <a:rPr lang="de-DE" smtClean="0"/>
               <a:pPr/>
-              <a:t>18.01.2013</a:t>
+              <a:t>23.01.2013</a:t>
             </a:fld>
             <a:endParaRPr lang="de-DE"/>
           </a:p>
@@ -2588,7 +2590,7 @@
             <a:fld id="{1BA50D42-C9CD-4801-B293-61D1F53EC57E}" type="datetimeFigureOut">
               <a:rPr lang="de-DE" smtClean="0"/>
               <a:pPr/>
-              <a:t>18.01.2013</a:t>
+              <a:t>23.01.2013</a:t>
             </a:fld>
             <a:endParaRPr lang="de-DE"/>
           </a:p>
@@ -2849,7 +2851,7 @@
             <a:fld id="{1BA50D42-C9CD-4801-B293-61D1F53EC57E}" type="datetimeFigureOut">
               <a:rPr lang="de-DE" smtClean="0"/>
               <a:pPr/>
-              <a:t>18.01.2013</a:t>
+              <a:t>23.01.2013</a:t>
             </a:fld>
             <a:endParaRPr lang="de-DE"/>
           </a:p>
@@ -3255,7 +3257,7 @@
             <a:fld id="{1BA50D42-C9CD-4801-B293-61D1F53EC57E}" type="datetimeFigureOut">
               <a:rPr lang="de-DE" smtClean="0"/>
               <a:pPr/>
-              <a:t>18.01.2013</a:t>
+              <a:t>23.01.2013</a:t>
             </a:fld>
             <a:endParaRPr lang="de-DE"/>
           </a:p>
@@ -4194,7 +4196,7 @@
           <a:bodyPr/>
           <a:lstStyle/>
           <a:p>
-            <a:endParaRPr lang="de-DE"/>
+            <a:endParaRPr lang="de-DE" dirty="0"/>
           </a:p>
         </p:txBody>
       </p:sp>
@@ -4265,10 +4267,260 @@
           <a:bodyPr/>
           <a:lstStyle/>
           <a:p>
+            <a:r>
+              <a:rPr lang="de-DE" dirty="0" smtClean="0"/>
+              <a:t>Server – Part</a:t>
+            </a:r>
+          </a:p>
+          <a:p>
+            <a:r>
+              <a:rPr lang="de-DE" dirty="0" smtClean="0"/>
+              <a:t>Anfragen bearbeiten (POST-</a:t>
+            </a:r>
+            <a:r>
+              <a:rPr lang="de-DE" dirty="0" err="1" smtClean="0"/>
+              <a:t>request</a:t>
+            </a:r>
+            <a:r>
+              <a:rPr lang="de-DE" dirty="0" smtClean="0"/>
+              <a:t>)</a:t>
+            </a:r>
+          </a:p>
+          <a:p>
+            <a:r>
+              <a:rPr lang="de-DE" dirty="0" smtClean="0"/>
+              <a:t>speichern/ auslesen aus DB (</a:t>
+            </a:r>
+            <a:r>
+              <a:rPr lang="de-DE" dirty="0" err="1" smtClean="0"/>
+              <a:t>MySql</a:t>
+            </a:r>
+            <a:r>
+              <a:rPr lang="de-DE" dirty="0" smtClean="0"/>
+              <a:t>)</a:t>
+            </a:r>
+          </a:p>
+          <a:p>
+            <a:r>
+              <a:rPr lang="de-DE" dirty="0" err="1"/>
+              <a:t>Scripte</a:t>
+            </a:r>
+            <a:r>
+              <a:rPr lang="de-DE" dirty="0"/>
+              <a:t> -&gt; </a:t>
+            </a:r>
+            <a:r>
+              <a:rPr lang="de-DE" dirty="0" smtClean="0"/>
+              <a:t>PHP</a:t>
+            </a:r>
+          </a:p>
+          <a:p>
+            <a:r>
+              <a:rPr lang="de-DE" dirty="0" smtClean="0"/>
+              <a:t>Datenbank Zugriff -&gt; </a:t>
+            </a:r>
+            <a:r>
+              <a:rPr lang="de-DE" dirty="0" err="1" smtClean="0"/>
+              <a:t>Propel</a:t>
+            </a:r>
+            <a:endParaRPr lang="de-DE" dirty="0" smtClean="0"/>
+          </a:p>
+          <a:p>
+            <a:pPr marL="36576" indent="0">
+              <a:buNone/>
+            </a:pPr>
+            <a:endParaRPr lang="de-DE" dirty="0" smtClean="0"/>
+          </a:p>
+        </p:txBody>
+      </p:sp>
+      <p:pic>
+        <p:nvPicPr>
+          <p:cNvPr id="1026" name="Picture 2" descr="http://i.computer-bild.de/imgs/3/7/2/3/0/5/3/Samsung-Galaxy-S3-227x170-1c8da90f1d6a8a99.jpg"/>
+          <p:cNvPicPr>
+            <a:picLocks noChangeAspect="1" noChangeArrowheads="1"/>
+          </p:cNvPicPr>
+          <p:nvPr/>
+        </p:nvPicPr>
+        <p:blipFill>
+          <a:blip r:embed="rId2">
+            <a:extLst>
+              <a:ext uri="{28A0092B-C50C-407E-A947-70E740481C1C}">
+                <a14:useLocalDpi xmlns:a14="http://schemas.microsoft.com/office/drawing/2010/main" val="0"/>
+              </a:ext>
+            </a:extLst>
+          </a:blip>
+          <a:srcRect/>
+          <a:stretch>
+            <a:fillRect/>
+          </a:stretch>
+        </p:blipFill>
+        <p:spPr bwMode="auto">
+          <a:xfrm>
+            <a:off x="323529" y="4869160"/>
+            <a:ext cx="1873720" cy="1403227"/>
+          </a:xfrm>
+          <a:prstGeom prst="rect">
+            <a:avLst/>
+          </a:prstGeom>
+          <a:noFill/>
+          <a:extLst>
+            <a:ext uri="{909E8E84-426E-40DD-AFC4-6F175D3DCCD1}">
+              <a14:hiddenFill xmlns:a14="http://schemas.microsoft.com/office/drawing/2010/main">
+                <a:solidFill>
+                  <a:srgbClr val="FFFFFF"/>
+                </a:solidFill>
+              </a14:hiddenFill>
+            </a:ext>
+          </a:extLst>
+        </p:spPr>
+      </p:pic>
+      <p:sp>
+        <p:nvSpPr>
+          <p:cNvPr id="4" name="Wolke 3"/>
+          <p:cNvSpPr/>
+          <p:nvPr/>
+        </p:nvSpPr>
+        <p:spPr>
+          <a:xfrm>
+            <a:off x="3360795" y="5264739"/>
+            <a:ext cx="1402695" cy="612069"/>
+          </a:xfrm>
+          <a:prstGeom prst="cloud">
+            <a:avLst/>
+          </a:prstGeom>
+        </p:spPr>
+        <p:style>
+          <a:lnRef idx="2">
+            <a:schemeClr val="accent1">
+              <a:shade val="50000"/>
+            </a:schemeClr>
+          </a:lnRef>
+          <a:fillRef idx="1">
+            <a:schemeClr val="accent1"/>
+          </a:fillRef>
+          <a:effectRef idx="0">
+            <a:schemeClr val="accent1"/>
+          </a:effectRef>
+          <a:fontRef idx="minor">
+            <a:schemeClr val="lt1"/>
+          </a:fontRef>
+        </p:style>
+        <p:txBody>
+          <a:bodyPr rtlCol="0" anchor="ctr"/>
+          <a:lstStyle/>
+          <a:p>
+            <a:pPr algn="ctr"/>
             <a:endParaRPr lang="de-DE"/>
           </a:p>
         </p:txBody>
       </p:sp>
+      <p:cxnSp>
+        <p:nvCxnSpPr>
+          <p:cNvPr id="6" name="Gerade Verbindung 5"/>
+          <p:cNvCxnSpPr>
+            <a:stCxn id="4" idx="2"/>
+            <a:endCxn id="1026" idx="3"/>
+          </p:cNvCxnSpPr>
+          <p:nvPr/>
+        </p:nvCxnSpPr>
+        <p:spPr>
+          <a:xfrm flipH="1">
+            <a:off x="2197249" y="5570774"/>
+            <a:ext cx="1167897" cy="0"/>
+          </a:xfrm>
+          <a:prstGeom prst="line">
+            <a:avLst/>
+          </a:prstGeom>
+        </p:spPr>
+        <p:style>
+          <a:lnRef idx="3">
+            <a:schemeClr val="dk1"/>
+          </a:lnRef>
+          <a:fillRef idx="0">
+            <a:schemeClr val="dk1"/>
+          </a:fillRef>
+          <a:effectRef idx="2">
+            <a:schemeClr val="dk1"/>
+          </a:effectRef>
+          <a:fontRef idx="minor">
+            <a:schemeClr val="tx1"/>
+          </a:fontRef>
+        </p:style>
+      </p:cxnSp>
+      <p:cxnSp>
+        <p:nvCxnSpPr>
+          <p:cNvPr id="11" name="Gerade Verbindung 10"/>
+          <p:cNvCxnSpPr>
+            <a:stCxn id="4" idx="0"/>
+            <a:endCxn id="1028" idx="1"/>
+          </p:cNvCxnSpPr>
+          <p:nvPr/>
+        </p:nvCxnSpPr>
+        <p:spPr>
+          <a:xfrm flipV="1">
+            <a:off x="4762321" y="5570773"/>
+            <a:ext cx="1105823" cy="1"/>
+          </a:xfrm>
+          <a:prstGeom prst="line">
+            <a:avLst/>
+          </a:prstGeom>
+        </p:spPr>
+        <p:style>
+          <a:lnRef idx="2">
+            <a:schemeClr val="dk1"/>
+          </a:lnRef>
+          <a:fillRef idx="0">
+            <a:schemeClr val="dk1"/>
+          </a:fillRef>
+          <a:effectRef idx="1">
+            <a:schemeClr val="dk1"/>
+          </a:effectRef>
+          <a:fontRef idx="minor">
+            <a:schemeClr val="tx1"/>
+          </a:fontRef>
+        </p:style>
+      </p:cxnSp>
+      <p:pic>
+        <p:nvPicPr>
+          <p:cNvPr id="1028" name="Picture 4" descr="Vollbild anzeigen"/>
+          <p:cNvPicPr>
+            <a:picLocks noChangeAspect="1" noChangeArrowheads="1"/>
+          </p:cNvPicPr>
+          <p:nvPr/>
+        </p:nvPicPr>
+        <p:blipFill>
+          <a:blip r:embed="rId3">
+            <a:extLst>
+              <a:ext uri="{28A0092B-C50C-407E-A947-70E740481C1C}">
+                <a14:useLocalDpi xmlns:a14="http://schemas.microsoft.com/office/drawing/2010/main" val="0"/>
+              </a:ext>
+            </a:extLst>
+          </a:blip>
+          <a:srcRect/>
+          <a:stretch>
+            <a:fillRect/>
+          </a:stretch>
+        </p:blipFill>
+        <p:spPr bwMode="auto">
+          <a:xfrm>
+            <a:off x="5868144" y="5189773"/>
+            <a:ext cx="790575" cy="762000"/>
+          </a:xfrm>
+          <a:prstGeom prst="rect">
+            <a:avLst/>
+          </a:prstGeom>
+          <a:noFill/>
+          <a:extLst>
+            <a:ext uri="{909E8E84-426E-40DD-AFC4-6F175D3DCCD1}">
+              <a14:hiddenFill xmlns:a14="http://schemas.microsoft.com/office/drawing/2010/main">
+                <a:solidFill>
+                  <a:srgbClr val="FFFFFF"/>
+                </a:solidFill>
+              </a14:hiddenFill>
+            </a:ext>
+          </a:extLst>
+        </p:spPr>
+      </p:pic>
     </p:spTree>
   </p:cSld>
   <p:clrMapOvr>
@@ -4311,6 +4563,588 @@
           <a:p>
             <a:r>
               <a:rPr lang="de-DE" dirty="0"/>
+              <a:t>Arbeitsbereich - Marcel</a:t>
+            </a:r>
+          </a:p>
+        </p:txBody>
+      </p:sp>
+      <p:sp>
+        <p:nvSpPr>
+          <p:cNvPr id="3" name="Inhaltsplatzhalter 2"/>
+          <p:cNvSpPr>
+            <a:spLocks noGrp="1"/>
+          </p:cNvSpPr>
+          <p:nvPr>
+            <p:ph idx="1"/>
+          </p:nvPr>
+        </p:nvSpPr>
+        <p:spPr/>
+        <p:txBody>
+          <a:bodyPr/>
+          <a:lstStyle/>
+          <a:p>
+            <a:r>
+              <a:rPr lang="de-DE" dirty="0" err="1" smtClean="0"/>
+              <a:t>Scripte</a:t>
+            </a:r>
+            <a:r>
+              <a:rPr lang="de-DE" dirty="0" smtClean="0"/>
+              <a:t>/ Anfragen bearbeiten</a:t>
+            </a:r>
+            <a:endParaRPr lang="de-DE" dirty="0"/>
+          </a:p>
+        </p:txBody>
+      </p:sp>
+      <p:pic>
+        <p:nvPicPr>
+          <p:cNvPr id="2051" name="Picture 3"/>
+          <p:cNvPicPr>
+            <a:picLocks noChangeAspect="1" noChangeArrowheads="1"/>
+          </p:cNvPicPr>
+          <p:nvPr/>
+        </p:nvPicPr>
+        <p:blipFill>
+          <a:blip r:embed="rId2">
+            <a:extLst>
+              <a:ext uri="{28A0092B-C50C-407E-A947-70E740481C1C}">
+                <a14:useLocalDpi xmlns:a14="http://schemas.microsoft.com/office/drawing/2010/main" val="0"/>
+              </a:ext>
+            </a:extLst>
+          </a:blip>
+          <a:srcRect/>
+          <a:stretch>
+            <a:fillRect/>
+          </a:stretch>
+        </p:blipFill>
+        <p:spPr bwMode="auto">
+          <a:xfrm>
+            <a:off x="274223" y="2780928"/>
+            <a:ext cx="8629650" cy="3562350"/>
+          </a:xfrm>
+          <a:prstGeom prst="rect">
+            <a:avLst/>
+          </a:prstGeom>
+          <a:noFill/>
+          <a:ln>
+            <a:noFill/>
+          </a:ln>
+          <a:effectLst/>
+          <a:extLst>
+            <a:ext uri="{909E8E84-426E-40DD-AFC4-6F175D3DCCD1}">
+              <a14:hiddenFill xmlns:a14="http://schemas.microsoft.com/office/drawing/2010/main">
+                <a:solidFill>
+                  <a:schemeClr val="accent1"/>
+                </a:solidFill>
+              </a14:hiddenFill>
+            </a:ext>
+            <a:ext uri="{91240B29-F687-4F45-9708-019B960494DF}">
+              <a14:hiddenLine xmlns:a14="http://schemas.microsoft.com/office/drawing/2010/main" w="9525">
+                <a:solidFill>
+                  <a:schemeClr val="tx1"/>
+                </a:solidFill>
+                <a:miter lim="800000"/>
+                <a:headEnd/>
+                <a:tailEnd/>
+              </a14:hiddenLine>
+            </a:ext>
+            <a:ext uri="{AF507438-7753-43E0-B8FC-AC1667EBCBE1}">
+              <a14:hiddenEffects xmlns:a14="http://schemas.microsoft.com/office/drawing/2010/main">
+                <a:effectLst>
+                  <a:outerShdw dist="35921" dir="2700000" algn="ctr" rotWithShape="0">
+                    <a:schemeClr val="bg2"/>
+                  </a:outerShdw>
+                </a:effectLst>
+              </a14:hiddenEffects>
+            </a:ext>
+          </a:extLst>
+        </p:spPr>
+      </p:pic>
+    </p:spTree>
+    <p:extLst>
+      <p:ext uri="{BB962C8B-B14F-4D97-AF65-F5344CB8AC3E}">
+        <p14:creationId xmlns:p14="http://schemas.microsoft.com/office/powerpoint/2010/main" val="4105771129"/>
+      </p:ext>
+    </p:extLst>
+  </p:cSld>
+  <p:clrMapOvr>
+    <a:masterClrMapping/>
+  </p:clrMapOvr>
+</p:sld>
+</file>
+
+<file path=ppt/slides/slide16.xml><?xml version="1.0" encoding="utf-8"?>
+<p:sld xmlns:a="http://schemas.openxmlformats.org/drawingml/2006/main" xmlns:r="http://schemas.openxmlformats.org/officeDocument/2006/relationships" xmlns:p="http://schemas.openxmlformats.org/presentationml/2006/main">
+  <p:cSld>
+    <p:spTree>
+      <p:nvGrpSpPr>
+        <p:cNvPr id="1" name=""/>
+        <p:cNvGrpSpPr/>
+        <p:nvPr/>
+      </p:nvGrpSpPr>
+      <p:grpSpPr>
+        <a:xfrm>
+          <a:off x="0" y="0"/>
+          <a:ext cx="0" cy="0"/>
+          <a:chOff x="0" y="0"/>
+          <a:chExt cx="0" cy="0"/>
+        </a:xfrm>
+      </p:grpSpPr>
+      <p:sp>
+        <p:nvSpPr>
+          <p:cNvPr id="2" name="Titel 1"/>
+          <p:cNvSpPr>
+            <a:spLocks noGrp="1"/>
+          </p:cNvSpPr>
+          <p:nvPr>
+            <p:ph type="title"/>
+          </p:nvPr>
+        </p:nvSpPr>
+        <p:spPr/>
+        <p:txBody>
+          <a:bodyPr/>
+          <a:lstStyle/>
+          <a:p>
+            <a:r>
+              <a:rPr lang="de-DE" dirty="0"/>
+              <a:t>Arbeitsbereich - Marcel</a:t>
+            </a:r>
+          </a:p>
+        </p:txBody>
+      </p:sp>
+      <p:sp>
+        <p:nvSpPr>
+          <p:cNvPr id="3" name="Inhaltsplatzhalter 2"/>
+          <p:cNvSpPr>
+            <a:spLocks noGrp="1"/>
+          </p:cNvSpPr>
+          <p:nvPr>
+            <p:ph idx="1"/>
+          </p:nvPr>
+        </p:nvSpPr>
+        <p:spPr/>
+        <p:txBody>
+          <a:bodyPr/>
+          <a:lstStyle/>
+          <a:p>
+            <a:r>
+              <a:rPr lang="de-DE" dirty="0" smtClean="0"/>
+              <a:t>Datenbank &amp; </a:t>
+            </a:r>
+            <a:r>
+              <a:rPr lang="de-DE" dirty="0" err="1" smtClean="0"/>
+              <a:t>Propel</a:t>
+            </a:r>
+            <a:endParaRPr lang="de-DE" dirty="0" smtClean="0"/>
+          </a:p>
+          <a:p>
+            <a:pPr marL="36576" indent="0">
+              <a:buNone/>
+            </a:pPr>
+            <a:endParaRPr lang="de-DE" dirty="0"/>
+          </a:p>
+        </p:txBody>
+      </p:sp>
+      <p:pic>
+        <p:nvPicPr>
+          <p:cNvPr id="1026" name="Picture 2"/>
+          <p:cNvPicPr>
+            <a:picLocks noChangeAspect="1" noChangeArrowheads="1"/>
+          </p:cNvPicPr>
+          <p:nvPr/>
+        </p:nvPicPr>
+        <p:blipFill>
+          <a:blip r:embed="rId2">
+            <a:extLst>
+              <a:ext uri="{28A0092B-C50C-407E-A947-70E740481C1C}">
+                <a14:useLocalDpi xmlns:a14="http://schemas.microsoft.com/office/drawing/2010/main" val="0"/>
+              </a:ext>
+            </a:extLst>
+          </a:blip>
+          <a:srcRect/>
+          <a:stretch>
+            <a:fillRect/>
+          </a:stretch>
+        </p:blipFill>
+        <p:spPr bwMode="auto">
+          <a:xfrm>
+            <a:off x="1115616" y="4941168"/>
+            <a:ext cx="4210050" cy="1495425"/>
+          </a:xfrm>
+          <a:prstGeom prst="rect">
+            <a:avLst/>
+          </a:prstGeom>
+          <a:noFill/>
+          <a:ln>
+            <a:noFill/>
+          </a:ln>
+          <a:effectLst/>
+          <a:extLst>
+            <a:ext uri="{909E8E84-426E-40DD-AFC4-6F175D3DCCD1}">
+              <a14:hiddenFill xmlns:a14="http://schemas.microsoft.com/office/drawing/2010/main">
+                <a:solidFill>
+                  <a:schemeClr val="accent1"/>
+                </a:solidFill>
+              </a14:hiddenFill>
+            </a:ext>
+            <a:ext uri="{91240B29-F687-4F45-9708-019B960494DF}">
+              <a14:hiddenLine xmlns:a14="http://schemas.microsoft.com/office/drawing/2010/main" w="9525">
+                <a:solidFill>
+                  <a:schemeClr val="tx1"/>
+                </a:solidFill>
+                <a:miter lim="800000"/>
+                <a:headEnd/>
+                <a:tailEnd/>
+              </a14:hiddenLine>
+            </a:ext>
+            <a:ext uri="{AF507438-7753-43E0-B8FC-AC1667EBCBE1}">
+              <a14:hiddenEffects xmlns:a14="http://schemas.microsoft.com/office/drawing/2010/main">
+                <a:effectLst>
+                  <a:outerShdw dist="35921" dir="2700000" algn="ctr" rotWithShape="0">
+                    <a:schemeClr val="bg2"/>
+                  </a:outerShdw>
+                </a:effectLst>
+              </a14:hiddenEffects>
+            </a:ext>
+          </a:extLst>
+        </p:spPr>
+      </p:pic>
+      <p:graphicFrame>
+        <p:nvGraphicFramePr>
+          <p:cNvPr id="5" name="Tabelle 4"/>
+          <p:cNvGraphicFramePr>
+            <a:graphicFrameLocks noGrp="1"/>
+          </p:cNvGraphicFramePr>
+          <p:nvPr>
+            <p:extLst>
+              <p:ext uri="{D42A27DB-BD31-4B8C-83A1-F6EECF244321}">
+                <p14:modId xmlns:p14="http://schemas.microsoft.com/office/powerpoint/2010/main" val="400661259"/>
+              </p:ext>
+            </p:extLst>
+          </p:nvPr>
+        </p:nvGraphicFramePr>
+        <p:xfrm>
+          <a:off x="2411760" y="2492896"/>
+          <a:ext cx="2111896" cy="1867514"/>
+        </p:xfrm>
+        <a:graphic>
+          <a:graphicData uri="http://schemas.openxmlformats.org/drawingml/2006/table">
+            <a:tbl>
+              <a:tblPr firstRow="1" bandRow="1">
+                <a:tableStyleId>{5C22544A-7EE6-4342-B048-85BDC9FD1C3A}</a:tableStyleId>
+              </a:tblPr>
+              <a:tblGrid>
+                <a:gridCol w="2111896"/>
+              </a:tblGrid>
+              <a:tr h="427355">
+                <a:tc>
+                  <a:txBody>
+                    <a:bodyPr/>
+                    <a:lstStyle/>
+                    <a:p>
+                      <a:r>
+                        <a:rPr lang="de-DE" dirty="0" smtClean="0"/>
+                        <a:t>User</a:t>
+                      </a:r>
+                      <a:endParaRPr lang="de-DE" dirty="0"/>
+                    </a:p>
+                  </a:txBody>
+                  <a:tcPr/>
+                </a:tc>
+              </a:tr>
+              <a:tr h="427355">
+                <a:tc>
+                  <a:txBody>
+                    <a:bodyPr/>
+                    <a:lstStyle/>
+                    <a:p>
+                      <a:r>
+                        <a:rPr lang="de-DE" dirty="0" err="1" smtClean="0"/>
+                        <a:t>id</a:t>
+                      </a:r>
+                      <a:endParaRPr lang="de-DE" dirty="0"/>
+                    </a:p>
+                  </a:txBody>
+                  <a:tcPr/>
+                </a:tc>
+              </a:tr>
+              <a:tr h="506402">
+                <a:tc>
+                  <a:txBody>
+                    <a:bodyPr/>
+                    <a:lstStyle/>
+                    <a:p>
+                      <a:r>
+                        <a:rPr lang="de-DE" dirty="0" err="1" smtClean="0"/>
+                        <a:t>name</a:t>
+                      </a:r>
+                      <a:endParaRPr lang="de-DE" dirty="0"/>
+                    </a:p>
+                  </a:txBody>
+                  <a:tcPr/>
+                </a:tc>
+              </a:tr>
+              <a:tr h="506402">
+                <a:tc>
+                  <a:txBody>
+                    <a:bodyPr/>
+                    <a:lstStyle/>
+                    <a:p>
+                      <a:r>
+                        <a:rPr lang="de-DE" dirty="0" err="1" smtClean="0"/>
+                        <a:t>password</a:t>
+                      </a:r>
+                      <a:endParaRPr lang="de-DE" dirty="0"/>
+                    </a:p>
+                  </a:txBody>
+                  <a:tcPr/>
+                </a:tc>
+              </a:tr>
+            </a:tbl>
+          </a:graphicData>
+        </a:graphic>
+      </p:graphicFrame>
+      <p:graphicFrame>
+        <p:nvGraphicFramePr>
+          <p:cNvPr id="6" name="Tabelle 5"/>
+          <p:cNvGraphicFramePr>
+            <a:graphicFrameLocks noGrp="1"/>
+          </p:cNvGraphicFramePr>
+          <p:nvPr>
+            <p:extLst>
+              <p:ext uri="{D42A27DB-BD31-4B8C-83A1-F6EECF244321}">
+                <p14:modId xmlns:p14="http://schemas.microsoft.com/office/powerpoint/2010/main" val="1756623056"/>
+              </p:ext>
+            </p:extLst>
+          </p:nvPr>
+        </p:nvGraphicFramePr>
+        <p:xfrm>
+          <a:off x="6156176" y="2492896"/>
+          <a:ext cx="1737098" cy="2682240"/>
+        </p:xfrm>
+        <a:graphic>
+          <a:graphicData uri="http://schemas.openxmlformats.org/drawingml/2006/table">
+            <a:tbl>
+              <a:tblPr firstRow="1" bandRow="1">
+                <a:tableStyleId>{5C22544A-7EE6-4342-B048-85BDC9FD1C3A}</a:tableStyleId>
+              </a:tblPr>
+              <a:tblGrid>
+                <a:gridCol w="1737098"/>
+              </a:tblGrid>
+              <a:tr h="257748">
+                <a:tc>
+                  <a:txBody>
+                    <a:bodyPr/>
+                    <a:lstStyle/>
+                    <a:p>
+                      <a:r>
+                        <a:rPr lang="de-DE" sz="1600" dirty="0" smtClean="0"/>
+                        <a:t>Note</a:t>
+                      </a:r>
+                      <a:endParaRPr lang="de-DE" sz="1600" dirty="0"/>
+                    </a:p>
+                  </a:txBody>
+                  <a:tcPr/>
+                </a:tc>
+              </a:tr>
+              <a:tr h="257748">
+                <a:tc>
+                  <a:txBody>
+                    <a:bodyPr/>
+                    <a:lstStyle/>
+                    <a:p>
+                      <a:r>
+                        <a:rPr lang="de-DE" sz="1600" dirty="0" err="1" smtClean="0"/>
+                        <a:t>id</a:t>
+                      </a:r>
+                      <a:endParaRPr lang="de-DE" sz="1600" dirty="0"/>
+                    </a:p>
+                  </a:txBody>
+                  <a:tcPr/>
+                </a:tc>
+              </a:tr>
+              <a:tr h="257748">
+                <a:tc>
+                  <a:txBody>
+                    <a:bodyPr/>
+                    <a:lstStyle/>
+                    <a:p>
+                      <a:r>
+                        <a:rPr lang="de-DE" sz="1600" dirty="0" err="1" smtClean="0"/>
+                        <a:t>user_id</a:t>
+                      </a:r>
+                      <a:endParaRPr lang="de-DE" sz="1600" dirty="0"/>
+                    </a:p>
+                  </a:txBody>
+                  <a:tcPr/>
+                </a:tc>
+              </a:tr>
+              <a:tr h="257748">
+                <a:tc>
+                  <a:txBody>
+                    <a:bodyPr/>
+                    <a:lstStyle/>
+                    <a:p>
+                      <a:r>
+                        <a:rPr lang="de-DE" sz="1600" dirty="0" smtClean="0"/>
+                        <a:t>title</a:t>
+                      </a:r>
+                      <a:endParaRPr lang="de-DE" sz="1600" dirty="0"/>
+                    </a:p>
+                  </a:txBody>
+                  <a:tcPr/>
+                </a:tc>
+              </a:tr>
+              <a:tr h="257748">
+                <a:tc>
+                  <a:txBody>
+                    <a:bodyPr/>
+                    <a:lstStyle/>
+                    <a:p>
+                      <a:r>
+                        <a:rPr lang="de-DE" sz="1600" dirty="0" err="1" smtClean="0"/>
+                        <a:t>content</a:t>
+                      </a:r>
+                      <a:endParaRPr lang="de-DE" sz="1600" dirty="0"/>
+                    </a:p>
+                  </a:txBody>
+                  <a:tcPr/>
+                </a:tc>
+              </a:tr>
+              <a:tr h="257748">
+                <a:tc>
+                  <a:txBody>
+                    <a:bodyPr/>
+                    <a:lstStyle/>
+                    <a:p>
+                      <a:r>
+                        <a:rPr lang="de-DE" sz="1600" dirty="0" err="1" smtClean="0"/>
+                        <a:t>created_at</a:t>
+                      </a:r>
+                      <a:endParaRPr lang="de-DE" sz="1600" dirty="0"/>
+                    </a:p>
+                  </a:txBody>
+                  <a:tcPr/>
+                </a:tc>
+              </a:tr>
+              <a:tr h="257748">
+                <a:tc>
+                  <a:txBody>
+                    <a:bodyPr/>
+                    <a:lstStyle/>
+                    <a:p>
+                      <a:r>
+                        <a:rPr lang="de-DE" sz="1600" dirty="0" err="1" smtClean="0"/>
+                        <a:t>valid_to</a:t>
+                      </a:r>
+                      <a:endParaRPr lang="de-DE" sz="1600" dirty="0"/>
+                    </a:p>
+                  </a:txBody>
+                  <a:tcPr/>
+                </a:tc>
+              </a:tr>
+              <a:tr h="257748">
+                <a:tc>
+                  <a:txBody>
+                    <a:bodyPr/>
+                    <a:lstStyle/>
+                    <a:p>
+                      <a:r>
+                        <a:rPr lang="de-DE" sz="1600" dirty="0" err="1" smtClean="0"/>
+                        <a:t>category</a:t>
+                      </a:r>
+                      <a:endParaRPr lang="de-DE" sz="1600" dirty="0"/>
+                    </a:p>
+                  </a:txBody>
+                  <a:tcPr/>
+                </a:tc>
+              </a:tr>
+            </a:tbl>
+          </a:graphicData>
+        </a:graphic>
+      </p:graphicFrame>
+      <p:cxnSp>
+        <p:nvCxnSpPr>
+          <p:cNvPr id="9" name="Gewinkelte Verbindung 8"/>
+          <p:cNvCxnSpPr/>
+          <p:nvPr/>
+        </p:nvCxnSpPr>
+        <p:spPr>
+          <a:xfrm rot="10800000">
+            <a:off x="4283968" y="3140968"/>
+            <a:ext cx="1872208" cy="216025"/>
+          </a:xfrm>
+          <a:prstGeom prst="bentConnector3">
+            <a:avLst/>
+          </a:prstGeom>
+          <a:ln>
+            <a:solidFill>
+              <a:srgbClr val="FF0000"/>
+            </a:solidFill>
+            <a:tailEnd type="arrow"/>
+          </a:ln>
+        </p:spPr>
+        <p:style>
+          <a:lnRef idx="3">
+            <a:schemeClr val="dk1"/>
+          </a:lnRef>
+          <a:fillRef idx="0">
+            <a:schemeClr val="dk1"/>
+          </a:fillRef>
+          <a:effectRef idx="2">
+            <a:schemeClr val="dk1"/>
+          </a:effectRef>
+          <a:fontRef idx="minor">
+            <a:schemeClr val="tx1"/>
+          </a:fontRef>
+        </p:style>
+      </p:cxnSp>
+    </p:spTree>
+    <p:extLst>
+      <p:ext uri="{BB962C8B-B14F-4D97-AF65-F5344CB8AC3E}">
+        <p14:creationId xmlns:p14="http://schemas.microsoft.com/office/powerpoint/2010/main" val="3744539948"/>
+      </p:ext>
+    </p:extLst>
+  </p:cSld>
+  <p:clrMapOvr>
+    <a:masterClrMapping/>
+  </p:clrMapOvr>
+</p:sld>
+</file>
+
+<file path=ppt/slides/slide17.xml><?xml version="1.0" encoding="utf-8"?>
+<p:sld xmlns:a="http://schemas.openxmlformats.org/drawingml/2006/main" xmlns:r="http://schemas.openxmlformats.org/officeDocument/2006/relationships" xmlns:p="http://schemas.openxmlformats.org/presentationml/2006/main">
+  <p:cSld>
+    <p:spTree>
+      <p:nvGrpSpPr>
+        <p:cNvPr id="1" name=""/>
+        <p:cNvGrpSpPr/>
+        <p:nvPr/>
+      </p:nvGrpSpPr>
+      <p:grpSpPr>
+        <a:xfrm>
+          <a:off x="0" y="0"/>
+          <a:ext cx="0" cy="0"/>
+          <a:chOff x="0" y="0"/>
+          <a:chExt cx="0" cy="0"/>
+        </a:xfrm>
+      </p:grpSpPr>
+      <p:sp>
+        <p:nvSpPr>
+          <p:cNvPr id="2" name="Titel 1"/>
+          <p:cNvSpPr>
+            <a:spLocks noGrp="1"/>
+          </p:cNvSpPr>
+          <p:nvPr>
+            <p:ph type="title"/>
+          </p:nvPr>
+        </p:nvSpPr>
+        <p:spPr/>
+        <p:txBody>
+          <a:bodyPr/>
+          <a:lstStyle/>
+          <a:p>
+            <a:r>
+              <a:rPr lang="de-DE" dirty="0"/>
               <a:t>Arbeitsbereich - </a:t>
             </a:r>
             <a:r>
@@ -4348,7 +5182,7 @@
 </p:sld>
 </file>
 
-<file path=ppt/slides/slide16.xml><?xml version="1.0" encoding="utf-8"?>
+<file path=ppt/slides/slide18.xml><?xml version="1.0" encoding="utf-8"?>
 <p:sld xmlns:a="http://schemas.openxmlformats.org/drawingml/2006/main" xmlns:r="http://schemas.openxmlformats.org/officeDocument/2006/relationships" xmlns:p="http://schemas.openxmlformats.org/presentationml/2006/main">
   <p:cSld>
     <p:spTree>
@@ -4795,7 +5629,7 @@
           <a:blip r:embed="rId2" cstate="print">
             <a:extLst>
               <a:ext uri="{28A0092B-C50C-407E-A947-70E740481C1C}">
-                <a14:useLocalDpi xmlns:a14="http://schemas.microsoft.com/office/drawing/2010/main" xmlns="" val="0"/>
+                <a14:useLocalDpi xmlns:a14="http://schemas.microsoft.com/office/drawing/2010/main" val="0"/>
               </a:ext>
             </a:extLst>
           </a:blip>
@@ -4815,7 +5649,7 @@
           <a:noFill/>
           <a:extLst>
             <a:ext uri="{909E8E84-426E-40DD-AFC4-6F175D3DCCD1}">
-              <a14:hiddenFill xmlns:a14="http://schemas.microsoft.com/office/drawing/2010/main" xmlns="">
+              <a14:hiddenFill xmlns:a14="http://schemas.microsoft.com/office/drawing/2010/main">
                 <a:solidFill>
                   <a:srgbClr val="FFFFFF"/>
                 </a:solidFill>
@@ -4836,7 +5670,7 @@
           <a:blip r:embed="rId3" cstate="print">
             <a:extLst>
               <a:ext uri="{28A0092B-C50C-407E-A947-70E740481C1C}">
-                <a14:useLocalDpi xmlns:a14="http://schemas.microsoft.com/office/drawing/2010/main" xmlns="" val="0"/>
+                <a14:useLocalDpi xmlns:a14="http://schemas.microsoft.com/office/drawing/2010/main" val="0"/>
               </a:ext>
             </a:extLst>
           </a:blip>
@@ -4856,7 +5690,7 @@
           <a:noFill/>
           <a:extLst>
             <a:ext uri="{909E8E84-426E-40DD-AFC4-6F175D3DCCD1}">
-              <a14:hiddenFill xmlns:a14="http://schemas.microsoft.com/office/drawing/2010/main" xmlns="">
+              <a14:hiddenFill xmlns:a14="http://schemas.microsoft.com/office/drawing/2010/main">
                 <a:solidFill>
                   <a:srgbClr val="FFFFFF"/>
                 </a:solidFill>
@@ -4877,7 +5711,7 @@
           <a:blip r:embed="rId4" cstate="print">
             <a:extLst>
               <a:ext uri="{28A0092B-C50C-407E-A947-70E740481C1C}">
-                <a14:useLocalDpi xmlns:a14="http://schemas.microsoft.com/office/drawing/2010/main" xmlns="" val="0"/>
+                <a14:useLocalDpi xmlns:a14="http://schemas.microsoft.com/office/drawing/2010/main" val="0"/>
               </a:ext>
             </a:extLst>
           </a:blip>
@@ -4897,7 +5731,7 @@
           <a:noFill/>
           <a:extLst>
             <a:ext uri="{909E8E84-426E-40DD-AFC4-6F175D3DCCD1}">
-              <a14:hiddenFill xmlns:a14="http://schemas.microsoft.com/office/drawing/2010/main" xmlns="">
+              <a14:hiddenFill xmlns:a14="http://schemas.microsoft.com/office/drawing/2010/main">
                 <a:solidFill>
                   <a:srgbClr val="FFFFFF"/>
                 </a:solidFill>
@@ -5678,7 +6512,7 @@
   <a:themeElements>
     <a:clrScheme name="Haemera">
       <a:dk1>
-        <a:sysClr val="windowText" lastClr="111518"/>
+        <a:sysClr val="windowText" lastClr="000000"/>
       </a:dk1>
       <a:lt1>
         <a:sysClr val="window" lastClr="FFFFFF"/>

</xml_diff>

<commit_message>
Fix my presentation part.
</commit_message>
<xml_diff>
--- a/documentation/presentation.pptx
+++ b/documentation/presentation.pptx
@@ -509,7 +509,7 @@
             <a:fld id="{1BA50D42-C9CD-4801-B293-61D1F53EC57E}" type="datetimeFigureOut">
               <a:rPr lang="de-DE" smtClean="0"/>
               <a:pPr/>
-              <a:t>23.01.2013</a:t>
+              <a:t>24.01.2013</a:t>
             </a:fld>
             <a:endParaRPr lang="de-DE"/>
           </a:p>
@@ -676,7 +676,7 @@
             <a:fld id="{1BA50D42-C9CD-4801-B293-61D1F53EC57E}" type="datetimeFigureOut">
               <a:rPr lang="de-DE" smtClean="0"/>
               <a:pPr/>
-              <a:t>23.01.2013</a:t>
+              <a:t>24.01.2013</a:t>
             </a:fld>
             <a:endParaRPr lang="de-DE"/>
           </a:p>
@@ -853,7 +853,7 @@
             <a:fld id="{1BA50D42-C9CD-4801-B293-61D1F53EC57E}" type="datetimeFigureOut">
               <a:rPr lang="de-DE" smtClean="0"/>
               <a:pPr/>
-              <a:t>23.01.2013</a:t>
+              <a:t>24.01.2013</a:t>
             </a:fld>
             <a:endParaRPr lang="de-DE"/>
           </a:p>
@@ -1024,7 +1024,7 @@
             <a:fld id="{1BA50D42-C9CD-4801-B293-61D1F53EC57E}" type="datetimeFigureOut">
               <a:rPr lang="de-DE" smtClean="0"/>
               <a:pPr/>
-              <a:t>23.01.2013</a:t>
+              <a:t>24.01.2013</a:t>
             </a:fld>
             <a:endParaRPr lang="de-DE"/>
           </a:p>
@@ -1481,7 +1481,7 @@
             <a:fld id="{1BA50D42-C9CD-4801-B293-61D1F53EC57E}" type="datetimeFigureOut">
               <a:rPr lang="de-DE" smtClean="0"/>
               <a:pPr/>
-              <a:t>23.01.2013</a:t>
+              <a:t>24.01.2013</a:t>
             </a:fld>
             <a:endParaRPr lang="de-DE"/>
           </a:p>
@@ -1747,7 +1747,7 @@
             <a:fld id="{1BA50D42-C9CD-4801-B293-61D1F53EC57E}" type="datetimeFigureOut">
               <a:rPr lang="de-DE" smtClean="0"/>
               <a:pPr/>
-              <a:t>23.01.2013</a:t>
+              <a:t>24.01.2013</a:t>
             </a:fld>
             <a:endParaRPr lang="de-DE"/>
           </a:p>
@@ -2123,7 +2123,7 @@
             <a:fld id="{1BA50D42-C9CD-4801-B293-61D1F53EC57E}" type="datetimeFigureOut">
               <a:rPr lang="de-DE" smtClean="0"/>
               <a:pPr/>
-              <a:t>23.01.2013</a:t>
+              <a:t>24.01.2013</a:t>
             </a:fld>
             <a:endParaRPr lang="de-DE"/>
           </a:p>
@@ -2247,7 +2247,7 @@
             <a:fld id="{1BA50D42-C9CD-4801-B293-61D1F53EC57E}" type="datetimeFigureOut">
               <a:rPr lang="de-DE" smtClean="0"/>
               <a:pPr/>
-              <a:t>23.01.2013</a:t>
+              <a:t>24.01.2013</a:t>
             </a:fld>
             <a:endParaRPr lang="de-DE"/>
           </a:p>
@@ -2339,7 +2339,7 @@
             <a:fld id="{1BA50D42-C9CD-4801-B293-61D1F53EC57E}" type="datetimeFigureOut">
               <a:rPr lang="de-DE" smtClean="0"/>
               <a:pPr/>
-              <a:t>23.01.2013</a:t>
+              <a:t>24.01.2013</a:t>
             </a:fld>
             <a:endParaRPr lang="de-DE"/>
           </a:p>
@@ -2590,7 +2590,7 @@
             <a:fld id="{1BA50D42-C9CD-4801-B293-61D1F53EC57E}" type="datetimeFigureOut">
               <a:rPr lang="de-DE" smtClean="0"/>
               <a:pPr/>
-              <a:t>23.01.2013</a:t>
+              <a:t>24.01.2013</a:t>
             </a:fld>
             <a:endParaRPr lang="de-DE"/>
           </a:p>
@@ -2851,7 +2851,7 @@
             <a:fld id="{1BA50D42-C9CD-4801-B293-61D1F53EC57E}" type="datetimeFigureOut">
               <a:rPr lang="de-DE" smtClean="0"/>
               <a:pPr/>
-              <a:t>23.01.2013</a:t>
+              <a:t>24.01.2013</a:t>
             </a:fld>
             <a:endParaRPr lang="de-DE"/>
           </a:p>
@@ -3257,7 +3257,7 @@
             <a:fld id="{1BA50D42-C9CD-4801-B293-61D1F53EC57E}" type="datetimeFigureOut">
               <a:rPr lang="de-DE" smtClean="0"/>
               <a:pPr/>
-              <a:t>23.01.2013</a:t>
+              <a:t>24.01.2013</a:t>
             </a:fld>
             <a:endParaRPr lang="de-DE"/>
           </a:p>
@@ -4267,63 +4267,100 @@
           <a:bodyPr/>
           <a:lstStyle/>
           <a:p>
-            <a:r>
-              <a:rPr lang="de-DE" dirty="0" smtClean="0"/>
+            <a:pPr>
+              <a:spcAft>
+                <a:spcPts val="400"/>
+              </a:spcAft>
+            </a:pPr>
+            <a:r>
+              <a:rPr lang="de-DE" sz="2400" dirty="0" smtClean="0"/>
               <a:t>Server – Part</a:t>
             </a:r>
           </a:p>
           <a:p>
-            <a:r>
-              <a:rPr lang="de-DE" dirty="0" smtClean="0"/>
+            <a:pPr>
+              <a:spcAft>
+                <a:spcPts val="400"/>
+              </a:spcAft>
+            </a:pPr>
+            <a:r>
+              <a:rPr lang="de-DE" sz="2400" dirty="0" smtClean="0"/>
               <a:t>Anfragen bearbeiten (POST-</a:t>
             </a:r>
             <a:r>
-              <a:rPr lang="de-DE" dirty="0" err="1" smtClean="0"/>
+              <a:rPr lang="de-DE" sz="2400" dirty="0" err="1" smtClean="0"/>
               <a:t>request</a:t>
             </a:r>
             <a:r>
-              <a:rPr lang="de-DE" dirty="0" smtClean="0"/>
+              <a:rPr lang="de-DE" sz="2400" dirty="0" smtClean="0"/>
               <a:t>)</a:t>
             </a:r>
           </a:p>
           <a:p>
-            <a:r>
-              <a:rPr lang="de-DE" dirty="0" smtClean="0"/>
+            <a:pPr>
+              <a:spcAft>
+                <a:spcPts val="400"/>
+              </a:spcAft>
+            </a:pPr>
+            <a:r>
+              <a:rPr lang="de-DE" sz="2400" dirty="0" smtClean="0"/>
+              <a:t>Anfragen/ Antworten als JSON-Strings</a:t>
+            </a:r>
+            <a:endParaRPr lang="de-DE" sz="2400" dirty="0" smtClean="0"/>
+          </a:p>
+          <a:p>
+            <a:pPr>
+              <a:spcAft>
+                <a:spcPts val="400"/>
+              </a:spcAft>
+            </a:pPr>
+            <a:r>
+              <a:rPr lang="de-DE" sz="2400" dirty="0" smtClean="0"/>
               <a:t>speichern/ auslesen aus DB (</a:t>
             </a:r>
             <a:r>
-              <a:rPr lang="de-DE" dirty="0" err="1" smtClean="0"/>
+              <a:rPr lang="de-DE" sz="2400" dirty="0" err="1" smtClean="0"/>
               <a:t>MySql</a:t>
             </a:r>
             <a:r>
-              <a:rPr lang="de-DE" dirty="0" smtClean="0"/>
+              <a:rPr lang="de-DE" sz="2400" dirty="0" smtClean="0"/>
               <a:t>)</a:t>
             </a:r>
           </a:p>
           <a:p>
-            <a:r>
-              <a:rPr lang="de-DE" dirty="0" err="1"/>
+            <a:pPr>
+              <a:spcAft>
+                <a:spcPts val="400"/>
+              </a:spcAft>
+            </a:pPr>
+            <a:r>
+              <a:rPr lang="de-DE" sz="2400" dirty="0" err="1"/>
               <a:t>Scripte</a:t>
             </a:r>
             <a:r>
-              <a:rPr lang="de-DE" dirty="0"/>
+              <a:rPr lang="de-DE" sz="2400" dirty="0"/>
               <a:t> -&gt; </a:t>
             </a:r>
             <a:r>
-              <a:rPr lang="de-DE" dirty="0" smtClean="0"/>
+              <a:rPr lang="de-DE" sz="2400" dirty="0" smtClean="0"/>
               <a:t>PHP</a:t>
             </a:r>
           </a:p>
           <a:p>
-            <a:r>
-              <a:rPr lang="de-DE" dirty="0" smtClean="0"/>
+            <a:pPr>
+              <a:spcAft>
+                <a:spcPts val="400"/>
+              </a:spcAft>
+            </a:pPr>
+            <a:r>
+              <a:rPr lang="de-DE" sz="2400" dirty="0" smtClean="0"/>
               <a:t>Datenbank Zugriff -&gt; </a:t>
             </a:r>
             <a:r>
-              <a:rPr lang="de-DE" dirty="0" err="1" smtClean="0"/>
+              <a:rPr lang="de-DE" sz="2400" dirty="0" err="1" smtClean="0"/>
               <a:t>Propel</a:t>
             </a:r>
-            <a:endParaRPr lang="de-DE" dirty="0" smtClean="0"/>
+            <a:endParaRPr lang="de-DE" sz="2400" dirty="0" smtClean="0"/>
           </a:p>
           <a:p>
             <a:pPr marL="36576" indent="0">
@@ -4580,18 +4617,20 @@
         </p:nvSpPr>
         <p:spPr/>
         <p:txBody>
-          <a:bodyPr/>
-          <a:lstStyle/>
-          <a:p>
-            <a:r>
-              <a:rPr lang="de-DE" dirty="0" err="1" smtClean="0"/>
+          <a:bodyPr>
+            <a:normAutofit/>
+          </a:bodyPr>
+          <a:lstStyle/>
+          <a:p>
+            <a:r>
+              <a:rPr lang="de-DE" sz="2400" dirty="0" err="1" smtClean="0"/>
               <a:t>Scripte</a:t>
             </a:r>
             <a:r>
-              <a:rPr lang="de-DE" dirty="0" smtClean="0"/>
+              <a:rPr lang="de-DE" sz="2400" dirty="0" smtClean="0"/>
               <a:t>/ Anfragen bearbeiten</a:t>
             </a:r>
-            <a:endParaRPr lang="de-DE" dirty="0"/>
+            <a:endParaRPr lang="de-DE" sz="2400" dirty="0"/>
           </a:p>
         </p:txBody>
       </p:sp>
@@ -4620,6 +4659,70 @@
           <a:xfrm>
             <a:off x="274223" y="2780928"/>
             <a:ext cx="8629650" cy="3562350"/>
+          </a:xfrm>
+          <a:prstGeom prst="rect">
+            <a:avLst/>
+          </a:prstGeom>
+          <a:noFill/>
+          <a:ln>
+            <a:noFill/>
+          </a:ln>
+          <a:effectLst/>
+          <a:extLst>
+            <a:ext uri="{909E8E84-426E-40DD-AFC4-6F175D3DCCD1}">
+              <a14:hiddenFill xmlns:a14="http://schemas.microsoft.com/office/drawing/2010/main">
+                <a:solidFill>
+                  <a:schemeClr val="accent1"/>
+                </a:solidFill>
+              </a14:hiddenFill>
+            </a:ext>
+            <a:ext uri="{91240B29-F687-4F45-9708-019B960494DF}">
+              <a14:hiddenLine xmlns:a14="http://schemas.microsoft.com/office/drawing/2010/main" w="9525">
+                <a:solidFill>
+                  <a:schemeClr val="tx1"/>
+                </a:solidFill>
+                <a:miter lim="800000"/>
+                <a:headEnd/>
+                <a:tailEnd/>
+              </a14:hiddenLine>
+            </a:ext>
+            <a:ext uri="{AF507438-7753-43E0-B8FC-AC1667EBCBE1}">
+              <a14:hiddenEffects xmlns:a14="http://schemas.microsoft.com/office/drawing/2010/main">
+                <a:effectLst>
+                  <a:outerShdw dist="35921" dir="2700000" algn="ctr" rotWithShape="0">
+                    <a:schemeClr val="bg2"/>
+                  </a:outerShdw>
+                </a:effectLst>
+              </a14:hiddenEffects>
+            </a:ext>
+          </a:extLst>
+        </p:spPr>
+      </p:pic>
+      <p:pic>
+        <p:nvPicPr>
+          <p:cNvPr id="1026" name="Picture 2"/>
+          <p:cNvPicPr>
+            <a:picLocks noChangeAspect="1" noChangeArrowheads="1"/>
+          </p:cNvPicPr>
+          <p:nvPr/>
+        </p:nvPicPr>
+        <p:blipFill>
+          <a:blip r:embed="rId3">
+            <a:extLst>
+              <a:ext uri="{28A0092B-C50C-407E-A947-70E740481C1C}">
+                <a14:useLocalDpi xmlns:a14="http://schemas.microsoft.com/office/drawing/2010/main" val="0"/>
+              </a:ext>
+            </a:extLst>
+          </a:blip>
+          <a:srcRect/>
+          <a:stretch>
+            <a:fillRect/>
+          </a:stretch>
+        </p:blipFill>
+        <p:spPr bwMode="auto">
+          <a:xfrm>
+            <a:off x="5508104" y="1399803"/>
+            <a:ext cx="3581400" cy="2762250"/>
           </a:xfrm>
           <a:prstGeom prst="rect">
             <a:avLst/>

</xml_diff>

<commit_message>
Add uml-sequence diagram to my part.
</commit_message>
<xml_diff>
--- a/documentation/presentation.pptx
+++ b/documentation/presentation.pptx
@@ -19,10 +19,11 @@
     <p:sldId id="271" r:id="rId13"/>
     <p:sldId id="268" r:id="rId14"/>
     <p:sldId id="262" r:id="rId15"/>
-    <p:sldId id="272" r:id="rId16"/>
-    <p:sldId id="273" r:id="rId17"/>
-    <p:sldId id="264" r:id="rId18"/>
-    <p:sldId id="263" r:id="rId19"/>
+    <p:sldId id="274" r:id="rId16"/>
+    <p:sldId id="272" r:id="rId17"/>
+    <p:sldId id="273" r:id="rId18"/>
+    <p:sldId id="264" r:id="rId19"/>
+    <p:sldId id="263" r:id="rId20"/>
   </p:sldIdLst>
   <p:sldSz cx="9144000" cy="6858000" type="screen4x3"/>
   <p:notesSz cx="6858000" cy="9144000"/>
@@ -3716,6 +3717,13 @@
   <p:clrMapOvr>
     <a:masterClrMapping/>
   </p:clrMapOvr>
+  <p:timing>
+    <p:tnLst>
+      <p:par>
+        <p:cTn id="1" dur="indefinite" restart="never" nodeType="tmRoot"/>
+      </p:par>
+    </p:tnLst>
+  </p:timing>
 </p:sld>
 </file>
 
@@ -3889,6 +3897,13 @@
   <p:clrMapOvr>
     <a:masterClrMapping/>
   </p:clrMapOvr>
+  <p:timing>
+    <p:tnLst>
+      <p:par>
+        <p:cTn id="1" dur="indefinite" restart="never" nodeType="tmRoot"/>
+      </p:par>
+    </p:tnLst>
+  </p:timing>
 </p:sld>
 </file>
 
@@ -4050,6 +4065,13 @@
   <p:clrMapOvr>
     <a:masterClrMapping/>
   </p:clrMapOvr>
+  <p:timing>
+    <p:tnLst>
+      <p:par>
+        <p:cTn id="1" dur="indefinite" restart="never" nodeType="tmRoot"/>
+      </p:par>
+    </p:tnLst>
+  </p:timing>
 </p:sld>
 </file>
 
@@ -4138,6 +4160,13 @@
   <p:clrMapOvr>
     <a:masterClrMapping/>
   </p:clrMapOvr>
+  <p:timing>
+    <p:tnLst>
+      <p:par>
+        <p:cTn id="1" dur="indefinite" restart="never" nodeType="tmRoot"/>
+      </p:par>
+    </p:tnLst>
+  </p:timing>
 </p:sld>
 </file>
 
@@ -4205,6 +4234,13 @@
   <p:clrMapOvr>
     <a:masterClrMapping/>
   </p:clrMapOvr>
+  <p:timing>
+    <p:tnLst>
+      <p:par>
+        <p:cTn id="1" dur="indefinite" restart="never" nodeType="tmRoot"/>
+      </p:par>
+    </p:tnLst>
+  </p:timing>
 </p:sld>
 </file>
 
@@ -4306,7 +4342,6 @@
               <a:rPr lang="de-DE" sz="2400" dirty="0" smtClean="0"/>
               <a:t>Anfragen/ Antworten als JSON-Strings</a:t>
             </a:r>
-            <a:endParaRPr lang="de-DE" sz="2400" dirty="0" smtClean="0"/>
           </a:p>
           <a:p>
             <a:pPr>
@@ -4563,10 +4598,145 @@
   <p:clrMapOvr>
     <a:masterClrMapping/>
   </p:clrMapOvr>
+  <p:timing>
+    <p:tnLst>
+      <p:par>
+        <p:cTn id="1" dur="indefinite" restart="never" nodeType="tmRoot"/>
+      </p:par>
+    </p:tnLst>
+  </p:timing>
 </p:sld>
 </file>
 
 <file path=ppt/slides/slide15.xml><?xml version="1.0" encoding="utf-8"?>
+<p:sld xmlns:a="http://schemas.openxmlformats.org/drawingml/2006/main" xmlns:r="http://schemas.openxmlformats.org/officeDocument/2006/relationships" xmlns:p="http://schemas.openxmlformats.org/presentationml/2006/main">
+  <p:cSld>
+    <p:spTree>
+      <p:nvGrpSpPr>
+        <p:cNvPr id="1" name=""/>
+        <p:cNvGrpSpPr/>
+        <p:nvPr/>
+      </p:nvGrpSpPr>
+      <p:grpSpPr>
+        <a:xfrm>
+          <a:off x="0" y="0"/>
+          <a:ext cx="0" cy="0"/>
+          <a:chOff x="0" y="0"/>
+          <a:chExt cx="0" cy="0"/>
+        </a:xfrm>
+      </p:grpSpPr>
+      <p:sp>
+        <p:nvSpPr>
+          <p:cNvPr id="2" name="Titel 1"/>
+          <p:cNvSpPr>
+            <a:spLocks noGrp="1"/>
+          </p:cNvSpPr>
+          <p:nvPr>
+            <p:ph type="title"/>
+          </p:nvPr>
+        </p:nvSpPr>
+        <p:spPr/>
+        <p:txBody>
+          <a:bodyPr/>
+          <a:lstStyle/>
+          <a:p>
+            <a:r>
+              <a:rPr lang="de-DE" dirty="0"/>
+              <a:t>Arbeitsbereich - Marcel</a:t>
+            </a:r>
+          </a:p>
+        </p:txBody>
+      </p:sp>
+      <p:sp>
+        <p:nvSpPr>
+          <p:cNvPr id="3" name="Inhaltsplatzhalter 2"/>
+          <p:cNvSpPr>
+            <a:spLocks noGrp="1"/>
+          </p:cNvSpPr>
+          <p:nvPr>
+            <p:ph idx="1"/>
+          </p:nvPr>
+        </p:nvSpPr>
+        <p:spPr>
+          <a:xfrm>
+            <a:off x="383327" y="1196752"/>
+            <a:ext cx="7467600" cy="4525963"/>
+          </a:xfrm>
+        </p:spPr>
+        <p:txBody>
+          <a:bodyPr/>
+          <a:lstStyle/>
+          <a:p>
+            <a:r>
+              <a:rPr lang="de-DE" dirty="0" smtClean="0"/>
+              <a:t>UML-Sequenzdiagramm</a:t>
+            </a:r>
+            <a:endParaRPr lang="de-DE" dirty="0"/>
+          </a:p>
+        </p:txBody>
+      </p:sp>
+      <p:pic>
+        <p:nvPicPr>
+          <p:cNvPr id="1026" name="Picture 2" descr="C:\Users\Marcel\Desktop\sequenzdiagramm.png"/>
+          <p:cNvPicPr>
+            <a:picLocks noChangeAspect="1" noChangeArrowheads="1"/>
+          </p:cNvPicPr>
+          <p:nvPr/>
+        </p:nvPicPr>
+        <p:blipFill>
+          <a:blip r:embed="rId2">
+            <a:extLst>
+              <a:ext uri="{28A0092B-C50C-407E-A947-70E740481C1C}">
+                <a14:useLocalDpi xmlns:a14="http://schemas.microsoft.com/office/drawing/2010/main" val="0"/>
+              </a:ext>
+            </a:extLst>
+          </a:blip>
+          <a:srcRect/>
+          <a:stretch>
+            <a:fillRect/>
+          </a:stretch>
+        </p:blipFill>
+        <p:spPr bwMode="auto">
+          <a:xfrm>
+            <a:off x="1691680" y="1700808"/>
+            <a:ext cx="5726113" cy="4667250"/>
+          </a:xfrm>
+          <a:prstGeom prst="rect">
+            <a:avLst/>
+          </a:prstGeom>
+          <a:noFill/>
+          <a:extLst>
+            <a:ext uri="{909E8E84-426E-40DD-AFC4-6F175D3DCCD1}">
+              <a14:hiddenFill xmlns:a14="http://schemas.microsoft.com/office/drawing/2010/main">
+                <a:solidFill>
+                  <a:srgbClr val="FFFFFF"/>
+                </a:solidFill>
+              </a14:hiddenFill>
+            </a:ext>
+          </a:extLst>
+        </p:spPr>
+      </p:pic>
+    </p:spTree>
+    <p:extLst>
+      <p:ext uri="{BB962C8B-B14F-4D97-AF65-F5344CB8AC3E}">
+        <p14:creationId xmlns:p14="http://schemas.microsoft.com/office/powerpoint/2010/main" val="983106541"/>
+      </p:ext>
+    </p:extLst>
+  </p:cSld>
+  <p:clrMapOvr>
+    <a:masterClrMapping/>
+  </p:clrMapOvr>
+  <p:timing>
+    <p:tnLst>
+      <p:par>
+        <p:cTn id="1" dur="indefinite" restart="never" nodeType="tmRoot"/>
+      </p:par>
+    </p:tnLst>
+  </p:timing>
+</p:sld>
+</file>
+
+<file path=ppt/slides/slide16.xml><?xml version="1.0" encoding="utf-8"?>
 <p:sld xmlns:a="http://schemas.openxmlformats.org/drawingml/2006/main" xmlns:r="http://schemas.openxmlformats.org/officeDocument/2006/relationships" xmlns:p="http://schemas.openxmlformats.org/presentationml/2006/main">
   <p:cSld>
     <p:spTree>
@@ -4772,10 +4942,17 @@
   <p:clrMapOvr>
     <a:masterClrMapping/>
   </p:clrMapOvr>
+  <p:timing>
+    <p:tnLst>
+      <p:par>
+        <p:cTn id="1" dur="indefinite" restart="never" nodeType="tmRoot"/>
+      </p:par>
+    </p:tnLst>
+  </p:timing>
 </p:sld>
 </file>
 
-<file path=ppt/slides/slide16.xml><?xml version="1.0" encoding="utf-8"?>
+<file path=ppt/slides/slide17.xml><?xml version="1.0" encoding="utf-8"?>
 <p:sld xmlns:a="http://schemas.openxmlformats.org/drawingml/2006/main" xmlns:r="http://schemas.openxmlformats.org/officeDocument/2006/relationships" xmlns:p="http://schemas.openxmlformats.org/presentationml/2006/main">
   <p:cSld>
     <p:spTree>
@@ -5211,77 +5388,13 @@
   <p:clrMapOvr>
     <a:masterClrMapping/>
   </p:clrMapOvr>
-</p:sld>
-</file>
-
-<file path=ppt/slides/slide17.xml><?xml version="1.0" encoding="utf-8"?>
-<p:sld xmlns:a="http://schemas.openxmlformats.org/drawingml/2006/main" xmlns:r="http://schemas.openxmlformats.org/officeDocument/2006/relationships" xmlns:p="http://schemas.openxmlformats.org/presentationml/2006/main">
-  <p:cSld>
-    <p:spTree>
-      <p:nvGrpSpPr>
-        <p:cNvPr id="1" name=""/>
-        <p:cNvGrpSpPr/>
-        <p:nvPr/>
-      </p:nvGrpSpPr>
-      <p:grpSpPr>
-        <a:xfrm>
-          <a:off x="0" y="0"/>
-          <a:ext cx="0" cy="0"/>
-          <a:chOff x="0" y="0"/>
-          <a:chExt cx="0" cy="0"/>
-        </a:xfrm>
-      </p:grpSpPr>
-      <p:sp>
-        <p:nvSpPr>
-          <p:cNvPr id="2" name="Titel 1"/>
-          <p:cNvSpPr>
-            <a:spLocks noGrp="1"/>
-          </p:cNvSpPr>
-          <p:nvPr>
-            <p:ph type="title"/>
-          </p:nvPr>
-        </p:nvSpPr>
-        <p:spPr/>
-        <p:txBody>
-          <a:bodyPr/>
-          <a:lstStyle/>
-          <a:p>
-            <a:r>
-              <a:rPr lang="de-DE" dirty="0"/>
-              <a:t>Arbeitsbereich - </a:t>
-            </a:r>
-            <a:r>
-              <a:rPr lang="de-DE" dirty="0" smtClean="0"/>
-              <a:t>Hasan</a:t>
-            </a:r>
-            <a:endParaRPr lang="de-DE" dirty="0"/>
-          </a:p>
-        </p:txBody>
-      </p:sp>
-      <p:sp>
-        <p:nvSpPr>
-          <p:cNvPr id="3" name="Inhaltsplatzhalter 2"/>
-          <p:cNvSpPr>
-            <a:spLocks noGrp="1"/>
-          </p:cNvSpPr>
-          <p:nvPr>
-            <p:ph idx="1"/>
-          </p:nvPr>
-        </p:nvSpPr>
-        <p:spPr/>
-        <p:txBody>
-          <a:bodyPr/>
-          <a:lstStyle/>
-          <a:p>
-            <a:endParaRPr lang="de-DE"/>
-          </a:p>
-        </p:txBody>
-      </p:sp>
-    </p:spTree>
-  </p:cSld>
-  <p:clrMapOvr>
-    <a:masterClrMapping/>
-  </p:clrMapOvr>
+  <p:timing>
+    <p:tnLst>
+      <p:par>
+        <p:cTn id="1" dur="indefinite" restart="never" nodeType="tmRoot"/>
+      </p:par>
+    </p:tnLst>
+  </p:timing>
 </p:sld>
 </file>
 
@@ -5318,8 +5431,12 @@
           <a:lstStyle/>
           <a:p>
             <a:r>
+              <a:rPr lang="de-DE" dirty="0"/>
+              <a:t>Arbeitsbereich - </a:t>
+            </a:r>
+            <a:r>
               <a:rPr lang="de-DE" dirty="0" smtClean="0"/>
-              <a:t>Resultate</a:t>
+              <a:t>Hasan</a:t>
             </a:r>
             <a:endParaRPr lang="de-DE" dirty="0"/>
           </a:p>
@@ -5349,6 +5466,87 @@
   <p:clrMapOvr>
     <a:masterClrMapping/>
   </p:clrMapOvr>
+  <p:timing>
+    <p:tnLst>
+      <p:par>
+        <p:cTn id="1" dur="indefinite" restart="never" nodeType="tmRoot"/>
+      </p:par>
+    </p:tnLst>
+  </p:timing>
+</p:sld>
+</file>
+
+<file path=ppt/slides/slide19.xml><?xml version="1.0" encoding="utf-8"?>
+<p:sld xmlns:a="http://schemas.openxmlformats.org/drawingml/2006/main" xmlns:r="http://schemas.openxmlformats.org/officeDocument/2006/relationships" xmlns:p="http://schemas.openxmlformats.org/presentationml/2006/main">
+  <p:cSld>
+    <p:spTree>
+      <p:nvGrpSpPr>
+        <p:cNvPr id="1" name=""/>
+        <p:cNvGrpSpPr/>
+        <p:nvPr/>
+      </p:nvGrpSpPr>
+      <p:grpSpPr>
+        <a:xfrm>
+          <a:off x="0" y="0"/>
+          <a:ext cx="0" cy="0"/>
+          <a:chOff x="0" y="0"/>
+          <a:chExt cx="0" cy="0"/>
+        </a:xfrm>
+      </p:grpSpPr>
+      <p:sp>
+        <p:nvSpPr>
+          <p:cNvPr id="2" name="Titel 1"/>
+          <p:cNvSpPr>
+            <a:spLocks noGrp="1"/>
+          </p:cNvSpPr>
+          <p:nvPr>
+            <p:ph type="title"/>
+          </p:nvPr>
+        </p:nvSpPr>
+        <p:spPr/>
+        <p:txBody>
+          <a:bodyPr/>
+          <a:lstStyle/>
+          <a:p>
+            <a:r>
+              <a:rPr lang="de-DE" dirty="0" smtClean="0"/>
+              <a:t>Resultate</a:t>
+            </a:r>
+            <a:endParaRPr lang="de-DE" dirty="0"/>
+          </a:p>
+        </p:txBody>
+      </p:sp>
+      <p:sp>
+        <p:nvSpPr>
+          <p:cNvPr id="3" name="Inhaltsplatzhalter 2"/>
+          <p:cNvSpPr>
+            <a:spLocks noGrp="1"/>
+          </p:cNvSpPr>
+          <p:nvPr>
+            <p:ph idx="1"/>
+          </p:nvPr>
+        </p:nvSpPr>
+        <p:spPr/>
+        <p:txBody>
+          <a:bodyPr/>
+          <a:lstStyle/>
+          <a:p>
+            <a:endParaRPr lang="de-DE"/>
+          </a:p>
+        </p:txBody>
+      </p:sp>
+    </p:spTree>
+  </p:cSld>
+  <p:clrMapOvr>
+    <a:masterClrMapping/>
+  </p:clrMapOvr>
+  <p:timing>
+    <p:tnLst>
+      <p:par>
+        <p:cTn id="1" dur="indefinite" restart="never" nodeType="tmRoot"/>
+      </p:par>
+    </p:tnLst>
+  </p:timing>
 </p:sld>
 </file>
 
@@ -5473,6 +5671,13 @@
   <p:clrMapOvr>
     <a:masterClrMapping/>
   </p:clrMapOvr>
+  <p:timing>
+    <p:tnLst>
+      <p:par>
+        <p:cTn id="1" dur="indefinite" restart="never" nodeType="tmRoot"/>
+      </p:par>
+    </p:tnLst>
+  </p:timing>
 </p:sld>
 </file>
 
@@ -5605,6 +5810,13 @@
   <p:clrMapOvr>
     <a:masterClrMapping/>
   </p:clrMapOvr>
+  <p:timing>
+    <p:tnLst>
+      <p:par>
+        <p:cTn id="1" dur="indefinite" restart="never" nodeType="tmRoot"/>
+      </p:par>
+    </p:tnLst>
+  </p:timing>
 </p:sld>
 </file>
 
@@ -5848,6 +6060,13 @@
   <p:clrMapOvr>
     <a:masterClrMapping/>
   </p:clrMapOvr>
+  <p:timing>
+    <p:tnLst>
+      <p:par>
+        <p:cTn id="1" dur="indefinite" restart="never" nodeType="tmRoot"/>
+      </p:par>
+    </p:tnLst>
+  </p:timing>
 </p:sld>
 </file>
 
@@ -5995,6 +6214,13 @@
   <p:clrMapOvr>
     <a:masterClrMapping/>
   </p:clrMapOvr>
+  <p:timing>
+    <p:tnLst>
+      <p:par>
+        <p:cTn id="1" dur="indefinite" restart="never" nodeType="tmRoot"/>
+      </p:par>
+    </p:tnLst>
+  </p:timing>
 </p:sld>
 </file>
 
@@ -6165,6 +6391,13 @@
   <p:clrMapOvr>
     <a:masterClrMapping/>
   </p:clrMapOvr>
+  <p:timing>
+    <p:tnLst>
+      <p:par>
+        <p:cTn id="1" dur="indefinite" restart="never" nodeType="tmRoot"/>
+      </p:par>
+    </p:tnLst>
+  </p:timing>
 </p:sld>
 </file>
 
@@ -6328,6 +6561,13 @@
   <p:clrMapOvr>
     <a:masterClrMapping/>
   </p:clrMapOvr>
+  <p:timing>
+    <p:tnLst>
+      <p:par>
+        <p:cTn id="1" dur="indefinite" restart="never" nodeType="tmRoot"/>
+      </p:par>
+    </p:tnLst>
+  </p:timing>
 </p:sld>
 </file>
 
@@ -6444,6 +6684,13 @@
   <p:clrMapOvr>
     <a:masterClrMapping/>
   </p:clrMapOvr>
+  <p:timing>
+    <p:tnLst>
+      <p:par>
+        <p:cTn id="1" dur="indefinite" restart="never" nodeType="tmRoot"/>
+      </p:par>
+    </p:tnLst>
+  </p:timing>
 </p:sld>
 </file>
 
@@ -6607,6 +6854,13 @@
   <p:clrMapOvr>
     <a:masterClrMapping/>
   </p:clrMapOvr>
+  <p:timing>
+    <p:tnLst>
+      <p:par>
+        <p:cTn id="1" dur="indefinite" restart="never" nodeType="tmRoot"/>
+      </p:par>
+    </p:tnLst>
+  </p:timing>
 </p:sld>
 </file>
 

</xml_diff>